<commit_message>
Presentacion Sabatina Detección de Señales
</commit_message>
<xml_diff>
--- a/Tesis/Presentaciones/AMC_TDS.pptx
+++ b/Tesis/Presentaciones/AMC_TDS.pptx
@@ -5,17 +5,28 @@
     <p:sldMasterId id="2147483648" r:id="rId1"/>
   </p:sldMasterIdLst>
   <p:sldIdLst>
-    <p:sldId id="256" r:id="rId2"/>
-    <p:sldId id="257" r:id="rId3"/>
-    <p:sldId id="258" r:id="rId4"/>
-    <p:sldId id="259" r:id="rId5"/>
-    <p:sldId id="260" r:id="rId6"/>
-    <p:sldId id="261" r:id="rId7"/>
-    <p:sldId id="262" r:id="rId8"/>
-    <p:sldId id="263" r:id="rId9"/>
-    <p:sldId id="264" r:id="rId10"/>
-    <p:sldId id="265" r:id="rId11"/>
-    <p:sldId id="266" r:id="rId12"/>
+    <p:sldId id="257" r:id="rId2"/>
+    <p:sldId id="268" r:id="rId3"/>
+    <p:sldId id="267" r:id="rId4"/>
+    <p:sldId id="269" r:id="rId5"/>
+    <p:sldId id="270" r:id="rId6"/>
+    <p:sldId id="258" r:id="rId7"/>
+    <p:sldId id="259" r:id="rId8"/>
+    <p:sldId id="260" r:id="rId9"/>
+    <p:sldId id="261" r:id="rId10"/>
+    <p:sldId id="262" r:id="rId11"/>
+    <p:sldId id="263" r:id="rId12"/>
+    <p:sldId id="264" r:id="rId13"/>
+    <p:sldId id="265" r:id="rId14"/>
+    <p:sldId id="266" r:id="rId15"/>
+    <p:sldId id="271" r:id="rId16"/>
+    <p:sldId id="272" r:id="rId17"/>
+    <p:sldId id="273" r:id="rId18"/>
+    <p:sldId id="274" r:id="rId19"/>
+    <p:sldId id="275" r:id="rId20"/>
+    <p:sldId id="276" r:id="rId21"/>
+    <p:sldId id="277" r:id="rId22"/>
+    <p:sldId id="278" r:id="rId23"/>
   </p:sldIdLst>
   <p:sldSz cx="12192000" cy="6858000"/>
   <p:notesSz cx="6858000" cy="9144000"/>
@@ -116,7 +127,7 @@
   </p:defaultTextStyle>
   <p:extLst>
     <p:ext uri="{EFAFB233-063F-42B5-8137-9DF3F51BA10A}">
-      <p15:sldGuideLst xmlns:p15="http://schemas.microsoft.com/office/powerpoint/2012/main">
+      <p15:sldGuideLst xmlns:p15="http://schemas.microsoft.com/office/powerpoint/2012/main" xmlns="">
         <p15:guide id="1" orient="horz" pos="2160" userDrawn="1">
           <p15:clr>
             <a:srgbClr val="A4A3A4"/>
@@ -264,7 +275,7 @@
           <a:p>
             <a:fld id="{E6EF446E-3591-4F3A-8FD3-B07B341A4940}" type="datetimeFigureOut">
               <a:rPr lang="es-MX" smtClean="0"/>
-              <a:t>12/04/2018</a:t>
+              <a:t>05/05/2018</a:t>
             </a:fld>
             <a:endParaRPr lang="es-MX"/>
           </a:p>
@@ -434,7 +445,7 @@
           <a:p>
             <a:fld id="{E6EF446E-3591-4F3A-8FD3-B07B341A4940}" type="datetimeFigureOut">
               <a:rPr lang="es-MX" smtClean="0"/>
-              <a:t>12/04/2018</a:t>
+              <a:t>05/05/2018</a:t>
             </a:fld>
             <a:endParaRPr lang="es-MX"/>
           </a:p>
@@ -614,7 +625,7 @@
           <a:p>
             <a:fld id="{E6EF446E-3591-4F3A-8FD3-B07B341A4940}" type="datetimeFigureOut">
               <a:rPr lang="es-MX" smtClean="0"/>
-              <a:t>12/04/2018</a:t>
+              <a:t>05/05/2018</a:t>
             </a:fld>
             <a:endParaRPr lang="es-MX"/>
           </a:p>
@@ -784,7 +795,7 @@
           <a:p>
             <a:fld id="{E6EF446E-3591-4F3A-8FD3-B07B341A4940}" type="datetimeFigureOut">
               <a:rPr lang="es-MX" smtClean="0"/>
-              <a:t>12/04/2018</a:t>
+              <a:t>05/05/2018</a:t>
             </a:fld>
             <a:endParaRPr lang="es-MX"/>
           </a:p>
@@ -1030,7 +1041,7 @@
           <a:p>
             <a:fld id="{E6EF446E-3591-4F3A-8FD3-B07B341A4940}" type="datetimeFigureOut">
               <a:rPr lang="es-MX" smtClean="0"/>
-              <a:t>12/04/2018</a:t>
+              <a:t>05/05/2018</a:t>
             </a:fld>
             <a:endParaRPr lang="es-MX"/>
           </a:p>
@@ -1262,7 +1273,7 @@
           <a:p>
             <a:fld id="{E6EF446E-3591-4F3A-8FD3-B07B341A4940}" type="datetimeFigureOut">
               <a:rPr lang="es-MX" smtClean="0"/>
-              <a:t>12/04/2018</a:t>
+              <a:t>05/05/2018</a:t>
             </a:fld>
             <a:endParaRPr lang="es-MX"/>
           </a:p>
@@ -1629,7 +1640,7 @@
           <a:p>
             <a:fld id="{E6EF446E-3591-4F3A-8FD3-B07B341A4940}" type="datetimeFigureOut">
               <a:rPr lang="es-MX" smtClean="0"/>
-              <a:t>12/04/2018</a:t>
+              <a:t>05/05/2018</a:t>
             </a:fld>
             <a:endParaRPr lang="es-MX"/>
           </a:p>
@@ -1747,7 +1758,7 @@
           <a:p>
             <a:fld id="{E6EF446E-3591-4F3A-8FD3-B07B341A4940}" type="datetimeFigureOut">
               <a:rPr lang="es-MX" smtClean="0"/>
-              <a:t>12/04/2018</a:t>
+              <a:t>05/05/2018</a:t>
             </a:fld>
             <a:endParaRPr lang="es-MX"/>
           </a:p>
@@ -1842,7 +1853,7 @@
           <a:p>
             <a:fld id="{E6EF446E-3591-4F3A-8FD3-B07B341A4940}" type="datetimeFigureOut">
               <a:rPr lang="es-MX" smtClean="0"/>
-              <a:t>12/04/2018</a:t>
+              <a:t>05/05/2018</a:t>
             </a:fld>
             <a:endParaRPr lang="es-MX"/>
           </a:p>
@@ -2119,7 +2130,7 @@
           <a:p>
             <a:fld id="{E6EF446E-3591-4F3A-8FD3-B07B341A4940}" type="datetimeFigureOut">
               <a:rPr lang="es-MX" smtClean="0"/>
-              <a:t>12/04/2018</a:t>
+              <a:t>05/05/2018</a:t>
             </a:fld>
             <a:endParaRPr lang="es-MX"/>
           </a:p>
@@ -2372,7 +2383,7 @@
           <a:p>
             <a:fld id="{E6EF446E-3591-4F3A-8FD3-B07B341A4940}" type="datetimeFigureOut">
               <a:rPr lang="es-MX" smtClean="0"/>
-              <a:t>12/04/2018</a:t>
+              <a:t>05/05/2018</a:t>
             </a:fld>
             <a:endParaRPr lang="es-MX"/>
           </a:p>
@@ -2585,7 +2596,7 @@
           <a:p>
             <a:fld id="{E6EF446E-3591-4F3A-8FD3-B07B341A4940}" type="datetimeFigureOut">
               <a:rPr lang="es-MX" smtClean="0"/>
-              <a:t>12/04/2018</a:t>
+              <a:t>05/05/2018</a:t>
             </a:fld>
             <a:endParaRPr lang="es-MX"/>
           </a:p>
@@ -2997,71 +3008,98 @@
             <a:spLocks noGrp="1"/>
           </p:cNvSpPr>
           <p:nvPr>
-            <p:ph type="ctrTitle"/>
-          </p:nvPr>
-        </p:nvSpPr>
-        <p:spPr/>
-        <p:txBody>
-          <a:bodyPr/>
-          <a:lstStyle/>
-          <a:p>
-            <a:endParaRPr lang="es-MX"/>
-          </a:p>
-        </p:txBody>
-      </p:sp>
-      <p:sp>
-        <p:nvSpPr>
-          <p:cNvPr id="3" name="Subtítulo 2"/>
-          <p:cNvSpPr>
-            <a:spLocks noGrp="1"/>
-          </p:cNvSpPr>
-          <p:nvPr>
-            <p:ph type="subTitle" idx="1"/>
-          </p:nvPr>
-        </p:nvSpPr>
-        <p:spPr/>
-        <p:txBody>
-          <a:bodyPr/>
-          <a:lstStyle/>
-          <a:p>
-            <a:endParaRPr lang="es-MX"/>
-          </a:p>
-        </p:txBody>
-      </p:sp>
-      <p:pic>
-        <p:nvPicPr>
-          <p:cNvPr id="4" name="Imagen 3"/>
-          <p:cNvPicPr>
-            <a:picLocks noChangeAspect="1"/>
-          </p:cNvPicPr>
-          <p:nvPr/>
-        </p:nvPicPr>
-        <p:blipFill>
-          <a:blip r:embed="rId2"/>
-          <a:stretch>
-            <a:fillRect/>
-          </a:stretch>
-        </p:blipFill>
-        <p:spPr>
-          <a:xfrm>
-            <a:off x="666750" y="709612"/>
-            <a:ext cx="10858500" cy="5438775"/>
-          </a:xfrm>
-          <a:prstGeom prst="rect">
-            <a:avLst/>
-          </a:prstGeom>
-        </p:spPr>
-      </p:pic>
+            <p:ph type="title"/>
+          </p:nvPr>
+        </p:nvSpPr>
+        <p:spPr/>
+        <p:txBody>
+          <a:bodyPr/>
+          <a:lstStyle/>
+          <a:p>
+            <a:r>
+              <a:rPr lang="es-MX" b="1" dirty="0" smtClean="0"/>
+              <a:t>El mundo está cargado de ruido e incertidumbre….</a:t>
+            </a:r>
+            <a:endParaRPr lang="es-MX" b="1" dirty="0"/>
+          </a:p>
+        </p:txBody>
+      </p:sp>
+      <p:sp>
+        <p:nvSpPr>
+          <p:cNvPr id="3" name="Marcador de contenido 2"/>
+          <p:cNvSpPr>
+            <a:spLocks noGrp="1"/>
+          </p:cNvSpPr>
+          <p:nvPr>
+            <p:ph idx="1"/>
+          </p:nvPr>
+        </p:nvSpPr>
+        <p:spPr/>
+        <p:txBody>
+          <a:bodyPr/>
+          <a:lstStyle/>
+          <a:p>
+            <a:pPr marL="0" indent="0">
+              <a:buNone/>
+            </a:pPr>
+            <a:endParaRPr lang="es-MX" dirty="0" smtClean="0"/>
+          </a:p>
+          <a:p>
+            <a:pPr marL="0" indent="0">
+              <a:buNone/>
+            </a:pPr>
+            <a:endParaRPr lang="es-MX" dirty="0"/>
+          </a:p>
+          <a:p>
+            <a:pPr marL="0" indent="0" algn="r">
+              <a:buNone/>
+            </a:pPr>
+            <a:r>
+              <a:rPr lang="es-MX" dirty="0" smtClean="0"/>
+              <a:t>Uno de los problemas más frecuentes a los que se enfrentan los organismos es la detección de estados o eventos específicos (</a:t>
+            </a:r>
+            <a:r>
+              <a:rPr lang="es-MX" b="1" dirty="0" smtClean="0"/>
+              <a:t>señales</a:t>
+            </a:r>
+            <a:r>
+              <a:rPr lang="es-MX" dirty="0" smtClean="0"/>
+              <a:t>) que les proporcionen información relevante sobre el estado del mundo (</a:t>
+            </a:r>
+            <a:r>
+              <a:rPr lang="es-MX" dirty="0" err="1" smtClean="0"/>
+              <a:t>McNicol</a:t>
+            </a:r>
+            <a:r>
+              <a:rPr lang="es-MX" dirty="0" smtClean="0"/>
+              <a:t>, 2005).</a:t>
+            </a:r>
+          </a:p>
+          <a:p>
+            <a:pPr marL="0" indent="0">
+              <a:buNone/>
+            </a:pPr>
+            <a:endParaRPr lang="es-MX" dirty="0" smtClean="0"/>
+          </a:p>
+        </p:txBody>
+      </p:sp>
     </p:spTree>
     <p:extLst>
       <p:ext uri="{BB962C8B-B14F-4D97-AF65-F5344CB8AC3E}">
-        <p14:creationId xmlns:p14="http://schemas.microsoft.com/office/powerpoint/2010/main" val="172888139"/>
+        <p14:creationId xmlns:p14="http://schemas.microsoft.com/office/powerpoint/2010/main" val="3458915282"/>
       </p:ext>
     </p:extLst>
   </p:cSld>
   <p:clrMapOvr>
     <a:masterClrMapping/>
   </p:clrMapOvr>
+  <p:timing>
+    <p:tnLst>
+      <p:par>
+        <p:cTn id="1" dur="indefinite" restart="never" nodeType="tmRoot"/>
+      </p:par>
+    </p:tnLst>
+  </p:timing>
 </p:sld>
 </file>
 
@@ -3082,145 +3120,9 @@
           <a:chExt cx="0" cy="0"/>
         </a:xfrm>
       </p:grpSpPr>
-      <p:sp>
-        <p:nvSpPr>
-          <p:cNvPr id="2" name="Título 1"/>
-          <p:cNvSpPr>
-            <a:spLocks noGrp="1"/>
-          </p:cNvSpPr>
-          <p:nvPr>
-            <p:ph type="title"/>
-          </p:nvPr>
-        </p:nvSpPr>
-        <p:spPr/>
-        <p:txBody>
-          <a:bodyPr/>
-          <a:lstStyle/>
-          <a:p>
-            <a:r>
-              <a:rPr lang="es-MX" dirty="0" smtClean="0"/>
-              <a:t/>
-            </a:r>
-            <a:br>
-              <a:rPr lang="es-MX" dirty="0" smtClean="0"/>
-            </a:br>
-            <a:endParaRPr lang="es-MX" dirty="0"/>
-          </a:p>
-        </p:txBody>
-      </p:sp>
-      <p:sp>
-        <p:nvSpPr>
-          <p:cNvPr id="3" name="Marcador de contenido 2"/>
-          <p:cNvSpPr>
-            <a:spLocks noGrp="1"/>
-          </p:cNvSpPr>
-          <p:nvPr>
-            <p:ph sz="half" idx="1"/>
-          </p:nvPr>
-        </p:nvSpPr>
-        <p:spPr/>
-        <p:txBody>
-          <a:bodyPr/>
-          <a:lstStyle/>
-          <a:p>
-            <a:endParaRPr lang="es-MX" dirty="0" smtClean="0"/>
-          </a:p>
-          <a:p>
-            <a:endParaRPr lang="es-MX" dirty="0"/>
-          </a:p>
-        </p:txBody>
-      </p:sp>
-      <p:sp>
-        <p:nvSpPr>
-          <p:cNvPr id="4" name="Marcador de contenido 3"/>
-          <p:cNvSpPr>
-            <a:spLocks noGrp="1"/>
-          </p:cNvSpPr>
-          <p:nvPr>
-            <p:ph sz="half" idx="2"/>
-          </p:nvPr>
-        </p:nvSpPr>
-        <p:spPr/>
-        <p:txBody>
-          <a:bodyPr/>
-          <a:lstStyle/>
-          <a:p>
-            <a:endParaRPr lang="es-MX" dirty="0" smtClean="0"/>
-          </a:p>
-          <a:p>
-            <a:endParaRPr lang="es-MX" dirty="0"/>
-          </a:p>
-        </p:txBody>
-      </p:sp>
-      <p:sp>
-        <p:nvSpPr>
-          <p:cNvPr id="5" name="Título 3"/>
-          <p:cNvSpPr txBox="1">
-            <a:spLocks/>
-          </p:cNvSpPr>
-          <p:nvPr/>
-        </p:nvSpPr>
-        <p:spPr>
-          <a:xfrm>
-            <a:off x="709411" y="0"/>
-            <a:ext cx="10515600" cy="1325563"/>
-          </a:xfrm>
-          <a:prstGeom prst="rect">
-            <a:avLst/>
-          </a:prstGeom>
-        </p:spPr>
-        <p:txBody>
-          <a:bodyPr vert="horz" lIns="91440" tIns="45720" rIns="91440" bIns="45720" rtlCol="0" anchor="ctr">
-            <a:normAutofit/>
-          </a:bodyPr>
-          <a:lstStyle>
-            <a:lvl1pPr algn="l" defTabSz="914400" rtl="0" eaLnBrk="1" latinLnBrk="0" hangingPunct="1">
-              <a:lnSpc>
-                <a:spcPct val="90000"/>
-              </a:lnSpc>
-              <a:spcBef>
-                <a:spcPct val="0"/>
-              </a:spcBef>
-              <a:buNone/>
-              <a:defRPr sz="4400" kern="1200">
-                <a:solidFill>
-                  <a:schemeClr val="tx1"/>
-                </a:solidFill>
-                <a:latin typeface="+mj-lt"/>
-                <a:ea typeface="+mj-ea"/>
-                <a:cs typeface="+mj-cs"/>
-              </a:defRPr>
-            </a:lvl1pPr>
-          </a:lstStyle>
-          <a:p>
-            <a:pPr algn="ctr"/>
-            <a:r>
-              <a:rPr lang="es-MX" b="1" smtClean="0">
-                <a:effectLst>
-                  <a:outerShdw blurRad="38100" dist="38100" dir="2700000" algn="tl">
-                    <a:srgbClr val="000000">
-                      <a:alpha val="43137"/>
-                    </a:srgbClr>
-                  </a:outerShdw>
-                </a:effectLst>
-              </a:rPr>
-              <a:t>Teoría de Detección de Señales</a:t>
-            </a:r>
-            <a:endParaRPr lang="es-MX" b="1" dirty="0">
-              <a:effectLst>
-                <a:outerShdw blurRad="38100" dist="38100" dir="2700000" algn="tl">
-                  <a:srgbClr val="000000">
-                    <a:alpha val="43137"/>
-                  </a:srgbClr>
-                </a:outerShdw>
-              </a:effectLst>
-            </a:endParaRPr>
-          </a:p>
-        </p:txBody>
-      </p:sp>
       <p:pic>
         <p:nvPicPr>
-          <p:cNvPr id="6" name="Imagen 5"/>
+          <p:cNvPr id="4" name="Imagen 3"/>
           <p:cNvPicPr>
             <a:picLocks noChangeAspect="1"/>
           </p:cNvPicPr>
@@ -3234,18 +3136,112 @@
         </p:blipFill>
         <p:spPr>
           <a:xfrm>
-            <a:off x="567444" y="2055813"/>
-            <a:ext cx="5133975" cy="3248025"/>
+            <a:off x="3796249" y="1284047"/>
+            <a:ext cx="8271255" cy="5239023"/>
           </a:xfrm>
           <a:prstGeom prst="rect">
             <a:avLst/>
           </a:prstGeom>
+        </p:spPr>
+      </p:pic>
+      <p:sp>
+        <p:nvSpPr>
+          <p:cNvPr id="2" name="Título 1"/>
+          <p:cNvSpPr>
+            <a:spLocks noGrp="1"/>
+          </p:cNvSpPr>
+          <p:nvPr>
+            <p:ph type="title"/>
+          </p:nvPr>
+        </p:nvSpPr>
+        <p:spPr>
+          <a:xfrm>
+            <a:off x="387439" y="296068"/>
+            <a:ext cx="10515600" cy="1325563"/>
+          </a:xfrm>
+        </p:spPr>
+        <p:txBody>
+          <a:bodyPr/>
+          <a:lstStyle/>
+          <a:p>
+            <a:r>
+              <a:rPr lang="es-MX" dirty="0" smtClean="0"/>
+              <a:t>Los aciertos pagan y los errores cuestan….</a:t>
+            </a:r>
+            <a:br>
+              <a:rPr lang="es-MX" dirty="0" smtClean="0"/>
+            </a:br>
+            <a:endParaRPr lang="es-MX" sz="2500" i="1" dirty="0"/>
+          </a:p>
+        </p:txBody>
+      </p:sp>
+      <p:sp>
+        <p:nvSpPr>
+          <p:cNvPr id="3" name="Marcador de contenido 2"/>
+          <p:cNvSpPr>
+            <a:spLocks noGrp="1"/>
+          </p:cNvSpPr>
+          <p:nvPr>
+            <p:ph idx="1"/>
+          </p:nvPr>
+        </p:nvSpPr>
+        <p:spPr/>
+        <p:txBody>
+          <a:bodyPr/>
+          <a:lstStyle/>
+          <a:p>
+            <a:endParaRPr lang="es-MX" dirty="0" smtClean="0"/>
+          </a:p>
+          <a:p>
+            <a:endParaRPr lang="es-MX" dirty="0"/>
+          </a:p>
+        </p:txBody>
+      </p:sp>
+      <p:pic>
+        <p:nvPicPr>
+          <p:cNvPr id="1026" name="Picture 2" descr="Resultado de imagen para conejo blanco y negro dibujo"/>
+          <p:cNvPicPr>
+            <a:picLocks noChangeAspect="1" noChangeArrowheads="1"/>
+          </p:cNvPicPr>
+          <p:nvPr/>
+        </p:nvPicPr>
+        <p:blipFill>
+          <a:blip r:embed="rId3">
+            <a:extLst>
+              <a:ext uri="{28A0092B-C50C-407E-A947-70E740481C1C}">
+                <a14:useLocalDpi xmlns:a14="http://schemas.microsoft.com/office/drawing/2010/main" val="0"/>
+              </a:ext>
+            </a:extLst>
+          </a:blip>
+          <a:srcRect/>
+          <a:stretch>
+            <a:fillRect/>
+          </a:stretch>
+        </p:blipFill>
+        <p:spPr bwMode="auto">
+          <a:xfrm>
+            <a:off x="838200" y="2743200"/>
+            <a:ext cx="2820651" cy="2118864"/>
+          </a:xfrm>
+          <a:prstGeom prst="rect">
+            <a:avLst/>
+          </a:prstGeom>
+          <a:noFill/>
+          <a:extLst>
+            <a:ext uri="{909E8E84-426E-40DD-AFC4-6F175D3DCCD1}">
+              <a14:hiddenFill xmlns:a14="http://schemas.microsoft.com/office/drawing/2010/main">
+                <a:solidFill>
+                  <a:srgbClr val="FFFFFF"/>
+                </a:solidFill>
+              </a14:hiddenFill>
+            </a:ext>
+          </a:extLst>
         </p:spPr>
       </p:pic>
     </p:spTree>
     <p:extLst>
       <p:ext uri="{BB962C8B-B14F-4D97-AF65-F5344CB8AC3E}">
-        <p14:creationId xmlns:p14="http://schemas.microsoft.com/office/powerpoint/2010/main" val="3967716401"/>
+        <p14:creationId xmlns:p14="http://schemas.microsoft.com/office/powerpoint/2010/main" val="692435972"/>
       </p:ext>
     </p:extLst>
   </p:cSld>
@@ -3289,6 +3285,508 @@
             <p:ph type="title"/>
           </p:nvPr>
         </p:nvSpPr>
+        <p:spPr>
+          <a:xfrm>
+            <a:off x="387439" y="296068"/>
+            <a:ext cx="10515600" cy="1325563"/>
+          </a:xfrm>
+        </p:spPr>
+        <p:txBody>
+          <a:bodyPr/>
+          <a:lstStyle/>
+          <a:p>
+            <a:r>
+              <a:rPr lang="es-MX" dirty="0" smtClean="0"/>
+              <a:t>Los aciertos pagan y los errores cuestan….</a:t>
+            </a:r>
+            <a:br>
+              <a:rPr lang="es-MX" dirty="0" smtClean="0"/>
+            </a:br>
+            <a:endParaRPr lang="es-MX" sz="2500" i="1" dirty="0"/>
+          </a:p>
+        </p:txBody>
+      </p:sp>
+      <p:sp>
+        <p:nvSpPr>
+          <p:cNvPr id="3" name="Marcador de contenido 2"/>
+          <p:cNvSpPr>
+            <a:spLocks noGrp="1"/>
+          </p:cNvSpPr>
+          <p:nvPr>
+            <p:ph idx="1"/>
+          </p:nvPr>
+        </p:nvSpPr>
+        <p:spPr/>
+        <p:txBody>
+          <a:bodyPr/>
+          <a:lstStyle/>
+          <a:p>
+            <a:endParaRPr lang="es-MX" dirty="0" smtClean="0"/>
+          </a:p>
+          <a:p>
+            <a:endParaRPr lang="es-MX" dirty="0"/>
+          </a:p>
+        </p:txBody>
+      </p:sp>
+      <p:pic>
+        <p:nvPicPr>
+          <p:cNvPr id="1026" name="Picture 2" descr="Resultado de imagen para conejo blanco y negro dibujo"/>
+          <p:cNvPicPr>
+            <a:picLocks noChangeAspect="1" noChangeArrowheads="1"/>
+          </p:cNvPicPr>
+          <p:nvPr/>
+        </p:nvPicPr>
+        <p:blipFill>
+          <a:blip r:embed="rId2">
+            <a:extLst>
+              <a:ext uri="{28A0092B-C50C-407E-A947-70E740481C1C}">
+                <a14:useLocalDpi xmlns:a14="http://schemas.microsoft.com/office/drawing/2010/main" val="0"/>
+              </a:ext>
+            </a:extLst>
+          </a:blip>
+          <a:srcRect/>
+          <a:stretch>
+            <a:fillRect/>
+          </a:stretch>
+        </p:blipFill>
+        <p:spPr bwMode="auto">
+          <a:xfrm>
+            <a:off x="838200" y="2743200"/>
+            <a:ext cx="2820651" cy="2118864"/>
+          </a:xfrm>
+          <a:prstGeom prst="rect">
+            <a:avLst/>
+          </a:prstGeom>
+          <a:noFill/>
+          <a:extLst>
+            <a:ext uri="{909E8E84-426E-40DD-AFC4-6F175D3DCCD1}">
+              <a14:hiddenFill xmlns:a14="http://schemas.microsoft.com/office/drawing/2010/main">
+                <a:solidFill>
+                  <a:srgbClr val="FFFFFF"/>
+                </a:solidFill>
+              </a14:hiddenFill>
+            </a:ext>
+          </a:extLst>
+        </p:spPr>
+      </p:pic>
+      <p:pic>
+        <p:nvPicPr>
+          <p:cNvPr id="5" name="Imagen 4"/>
+          <p:cNvPicPr>
+            <a:picLocks noChangeAspect="1"/>
+          </p:cNvPicPr>
+          <p:nvPr/>
+        </p:nvPicPr>
+        <p:blipFill>
+          <a:blip r:embed="rId3"/>
+          <a:stretch>
+            <a:fillRect/>
+          </a:stretch>
+        </p:blipFill>
+        <p:spPr>
+          <a:xfrm>
+            <a:off x="4883172" y="1054669"/>
+            <a:ext cx="6315075" cy="5495925"/>
+          </a:xfrm>
+          <a:prstGeom prst="rect">
+            <a:avLst/>
+          </a:prstGeom>
+        </p:spPr>
+      </p:pic>
+    </p:spTree>
+    <p:extLst>
+      <p:ext uri="{BB962C8B-B14F-4D97-AF65-F5344CB8AC3E}">
+        <p14:creationId xmlns:p14="http://schemas.microsoft.com/office/powerpoint/2010/main" val="3151862661"/>
+      </p:ext>
+    </p:extLst>
+  </p:cSld>
+  <p:clrMapOvr>
+    <a:masterClrMapping/>
+  </p:clrMapOvr>
+  <p:timing>
+    <p:tnLst>
+      <p:par>
+        <p:cTn id="1" dur="indefinite" restart="never" nodeType="tmRoot"/>
+      </p:par>
+    </p:tnLst>
+  </p:timing>
+</p:sld>
+</file>
+
+<file path=ppt/slides/slide12.xml><?xml version="1.0" encoding="utf-8"?>
+<p:sld xmlns:a="http://schemas.openxmlformats.org/drawingml/2006/main" xmlns:r="http://schemas.openxmlformats.org/officeDocument/2006/relationships" xmlns:p="http://schemas.openxmlformats.org/presentationml/2006/main">
+  <p:cSld>
+    <p:spTree>
+      <p:nvGrpSpPr>
+        <p:cNvPr id="1" name=""/>
+        <p:cNvGrpSpPr/>
+        <p:nvPr/>
+      </p:nvGrpSpPr>
+      <p:grpSpPr>
+        <a:xfrm>
+          <a:off x="0" y="0"/>
+          <a:ext cx="0" cy="0"/>
+          <a:chOff x="0" y="0"/>
+          <a:chExt cx="0" cy="0"/>
+        </a:xfrm>
+      </p:grpSpPr>
+      <p:sp>
+        <p:nvSpPr>
+          <p:cNvPr id="4" name="Título 3"/>
+          <p:cNvSpPr>
+            <a:spLocks noGrp="1"/>
+          </p:cNvSpPr>
+          <p:nvPr>
+            <p:ph type="title"/>
+          </p:nvPr>
+        </p:nvSpPr>
+        <p:spPr>
+          <a:xfrm>
+            <a:off x="593501" y="133305"/>
+            <a:ext cx="10515600" cy="1325563"/>
+          </a:xfrm>
+        </p:spPr>
+        <p:txBody>
+          <a:bodyPr/>
+          <a:lstStyle/>
+          <a:p>
+            <a:pPr algn="ctr"/>
+            <a:r>
+              <a:rPr lang="es-MX" b="1" dirty="0" smtClean="0">
+                <a:effectLst>
+                  <a:outerShdw blurRad="38100" dist="38100" dir="2700000" algn="tl">
+                    <a:srgbClr val="000000">
+                      <a:alpha val="43137"/>
+                    </a:srgbClr>
+                  </a:outerShdw>
+                </a:effectLst>
+              </a:rPr>
+              <a:t>Teoría de Detección de Señales</a:t>
+            </a:r>
+            <a:endParaRPr lang="es-MX" b="1" dirty="0">
+              <a:effectLst>
+                <a:outerShdw blurRad="38100" dist="38100" dir="2700000" algn="tl">
+                  <a:srgbClr val="000000">
+                    <a:alpha val="43137"/>
+                  </a:srgbClr>
+                </a:outerShdw>
+              </a:effectLst>
+            </a:endParaRPr>
+          </a:p>
+        </p:txBody>
+      </p:sp>
+      <p:sp>
+        <p:nvSpPr>
+          <p:cNvPr id="7" name="Marcador de contenido 6"/>
+          <p:cNvSpPr>
+            <a:spLocks noGrp="1"/>
+          </p:cNvSpPr>
+          <p:nvPr>
+            <p:ph sz="half" idx="1"/>
+          </p:nvPr>
+        </p:nvSpPr>
+        <p:spPr/>
+        <p:txBody>
+          <a:bodyPr/>
+          <a:lstStyle/>
+          <a:p>
+            <a:endParaRPr lang="es-MX" dirty="0" smtClean="0"/>
+          </a:p>
+          <a:p>
+            <a:endParaRPr lang="es-MX" dirty="0"/>
+          </a:p>
+        </p:txBody>
+      </p:sp>
+      <p:sp>
+        <p:nvSpPr>
+          <p:cNvPr id="8" name="Marcador de contenido 7"/>
+          <p:cNvSpPr>
+            <a:spLocks noGrp="1"/>
+          </p:cNvSpPr>
+          <p:nvPr>
+            <p:ph sz="half" idx="2"/>
+          </p:nvPr>
+        </p:nvSpPr>
+        <p:spPr/>
+        <p:txBody>
+          <a:bodyPr/>
+          <a:lstStyle/>
+          <a:p>
+            <a:endParaRPr lang="es-MX" dirty="0" smtClean="0"/>
+          </a:p>
+          <a:p>
+            <a:endParaRPr lang="es-MX" dirty="0"/>
+          </a:p>
+        </p:txBody>
+      </p:sp>
+      <p:pic>
+        <p:nvPicPr>
+          <p:cNvPr id="9" name="Imagen 8"/>
+          <p:cNvPicPr>
+            <a:picLocks noChangeAspect="1"/>
+          </p:cNvPicPr>
+          <p:nvPr/>
+        </p:nvPicPr>
+        <p:blipFill>
+          <a:blip r:embed="rId2"/>
+          <a:stretch>
+            <a:fillRect/>
+          </a:stretch>
+        </p:blipFill>
+        <p:spPr>
+          <a:xfrm>
+            <a:off x="2693764" y="1362075"/>
+            <a:ext cx="6315075" cy="5495925"/>
+          </a:xfrm>
+          <a:prstGeom prst="rect">
+            <a:avLst/>
+          </a:prstGeom>
+        </p:spPr>
+      </p:pic>
+    </p:spTree>
+    <p:extLst>
+      <p:ext uri="{BB962C8B-B14F-4D97-AF65-F5344CB8AC3E}">
+        <p14:creationId xmlns:p14="http://schemas.microsoft.com/office/powerpoint/2010/main" val="3063486277"/>
+      </p:ext>
+    </p:extLst>
+  </p:cSld>
+  <p:clrMapOvr>
+    <a:masterClrMapping/>
+  </p:clrMapOvr>
+  <p:timing>
+    <p:tnLst>
+      <p:par>
+        <p:cTn id="1" dur="indefinite" restart="never" nodeType="tmRoot"/>
+      </p:par>
+    </p:tnLst>
+  </p:timing>
+</p:sld>
+</file>
+
+<file path=ppt/slides/slide13.xml><?xml version="1.0" encoding="utf-8"?>
+<p:sld xmlns:a="http://schemas.openxmlformats.org/drawingml/2006/main" xmlns:r="http://schemas.openxmlformats.org/officeDocument/2006/relationships" xmlns:p="http://schemas.openxmlformats.org/presentationml/2006/main">
+  <p:cSld>
+    <p:spTree>
+      <p:nvGrpSpPr>
+        <p:cNvPr id="1" name=""/>
+        <p:cNvGrpSpPr/>
+        <p:nvPr/>
+      </p:nvGrpSpPr>
+      <p:grpSpPr>
+        <a:xfrm>
+          <a:off x="0" y="0"/>
+          <a:ext cx="0" cy="0"/>
+          <a:chOff x="0" y="0"/>
+          <a:chExt cx="0" cy="0"/>
+        </a:xfrm>
+      </p:grpSpPr>
+      <p:sp>
+        <p:nvSpPr>
+          <p:cNvPr id="2" name="Título 1"/>
+          <p:cNvSpPr>
+            <a:spLocks noGrp="1"/>
+          </p:cNvSpPr>
+          <p:nvPr>
+            <p:ph type="title"/>
+          </p:nvPr>
+        </p:nvSpPr>
+        <p:spPr/>
+        <p:txBody>
+          <a:bodyPr/>
+          <a:lstStyle/>
+          <a:p>
+            <a:r>
+              <a:rPr lang="es-MX" dirty="0" smtClean="0"/>
+              <a:t/>
+            </a:r>
+            <a:br>
+              <a:rPr lang="es-MX" dirty="0" smtClean="0"/>
+            </a:br>
+            <a:endParaRPr lang="es-MX" dirty="0"/>
+          </a:p>
+        </p:txBody>
+      </p:sp>
+      <p:sp>
+        <p:nvSpPr>
+          <p:cNvPr id="3" name="Marcador de contenido 2"/>
+          <p:cNvSpPr>
+            <a:spLocks noGrp="1"/>
+          </p:cNvSpPr>
+          <p:nvPr>
+            <p:ph sz="half" idx="1"/>
+          </p:nvPr>
+        </p:nvSpPr>
+        <p:spPr/>
+        <p:txBody>
+          <a:bodyPr/>
+          <a:lstStyle/>
+          <a:p>
+            <a:endParaRPr lang="es-MX" dirty="0" smtClean="0"/>
+          </a:p>
+          <a:p>
+            <a:endParaRPr lang="es-MX" dirty="0"/>
+          </a:p>
+        </p:txBody>
+      </p:sp>
+      <p:sp>
+        <p:nvSpPr>
+          <p:cNvPr id="4" name="Marcador de contenido 3"/>
+          <p:cNvSpPr>
+            <a:spLocks noGrp="1"/>
+          </p:cNvSpPr>
+          <p:nvPr>
+            <p:ph sz="half" idx="2"/>
+          </p:nvPr>
+        </p:nvSpPr>
+        <p:spPr/>
+        <p:txBody>
+          <a:bodyPr/>
+          <a:lstStyle/>
+          <a:p>
+            <a:endParaRPr lang="es-MX" dirty="0" smtClean="0"/>
+          </a:p>
+          <a:p>
+            <a:endParaRPr lang="es-MX" dirty="0"/>
+          </a:p>
+        </p:txBody>
+      </p:sp>
+      <p:sp>
+        <p:nvSpPr>
+          <p:cNvPr id="5" name="Título 3"/>
+          <p:cNvSpPr txBox="1">
+            <a:spLocks/>
+          </p:cNvSpPr>
+          <p:nvPr/>
+        </p:nvSpPr>
+        <p:spPr>
+          <a:xfrm>
+            <a:off x="709411" y="0"/>
+            <a:ext cx="10515600" cy="1325563"/>
+          </a:xfrm>
+          <a:prstGeom prst="rect">
+            <a:avLst/>
+          </a:prstGeom>
+        </p:spPr>
+        <p:txBody>
+          <a:bodyPr vert="horz" lIns="91440" tIns="45720" rIns="91440" bIns="45720" rtlCol="0" anchor="ctr">
+            <a:normAutofit/>
+          </a:bodyPr>
+          <a:lstStyle>
+            <a:lvl1pPr algn="l" defTabSz="914400" rtl="0" eaLnBrk="1" latinLnBrk="0" hangingPunct="1">
+              <a:lnSpc>
+                <a:spcPct val="90000"/>
+              </a:lnSpc>
+              <a:spcBef>
+                <a:spcPct val="0"/>
+              </a:spcBef>
+              <a:buNone/>
+              <a:defRPr sz="4400" kern="1200">
+                <a:solidFill>
+                  <a:schemeClr val="tx1"/>
+                </a:solidFill>
+                <a:latin typeface="+mj-lt"/>
+                <a:ea typeface="+mj-ea"/>
+                <a:cs typeface="+mj-cs"/>
+              </a:defRPr>
+            </a:lvl1pPr>
+          </a:lstStyle>
+          <a:p>
+            <a:pPr algn="ctr"/>
+            <a:r>
+              <a:rPr lang="es-MX" b="1" smtClean="0">
+                <a:effectLst>
+                  <a:outerShdw blurRad="38100" dist="38100" dir="2700000" algn="tl">
+                    <a:srgbClr val="000000">
+                      <a:alpha val="43137"/>
+                    </a:srgbClr>
+                  </a:outerShdw>
+                </a:effectLst>
+              </a:rPr>
+              <a:t>Teoría de Detección de Señales</a:t>
+            </a:r>
+            <a:endParaRPr lang="es-MX" b="1" dirty="0">
+              <a:effectLst>
+                <a:outerShdw blurRad="38100" dist="38100" dir="2700000" algn="tl">
+                  <a:srgbClr val="000000">
+                    <a:alpha val="43137"/>
+                  </a:srgbClr>
+                </a:outerShdw>
+              </a:effectLst>
+            </a:endParaRPr>
+          </a:p>
+        </p:txBody>
+      </p:sp>
+      <p:pic>
+        <p:nvPicPr>
+          <p:cNvPr id="6" name="Imagen 5"/>
+          <p:cNvPicPr>
+            <a:picLocks noChangeAspect="1"/>
+          </p:cNvPicPr>
+          <p:nvPr/>
+        </p:nvPicPr>
+        <p:blipFill>
+          <a:blip r:embed="rId2"/>
+          <a:stretch>
+            <a:fillRect/>
+          </a:stretch>
+        </p:blipFill>
+        <p:spPr>
+          <a:xfrm>
+            <a:off x="567444" y="2055813"/>
+            <a:ext cx="5133975" cy="3248025"/>
+          </a:xfrm>
+          <a:prstGeom prst="rect">
+            <a:avLst/>
+          </a:prstGeom>
+        </p:spPr>
+      </p:pic>
+    </p:spTree>
+    <p:extLst>
+      <p:ext uri="{BB962C8B-B14F-4D97-AF65-F5344CB8AC3E}">
+        <p14:creationId xmlns:p14="http://schemas.microsoft.com/office/powerpoint/2010/main" val="3967716401"/>
+      </p:ext>
+    </p:extLst>
+  </p:cSld>
+  <p:clrMapOvr>
+    <a:masterClrMapping/>
+  </p:clrMapOvr>
+  <p:timing>
+    <p:tnLst>
+      <p:par>
+        <p:cTn id="1" dur="indefinite" restart="never" nodeType="tmRoot"/>
+      </p:par>
+    </p:tnLst>
+  </p:timing>
+</p:sld>
+</file>
+
+<file path=ppt/slides/slide14.xml><?xml version="1.0" encoding="utf-8"?>
+<p:sld xmlns:a="http://schemas.openxmlformats.org/drawingml/2006/main" xmlns:r="http://schemas.openxmlformats.org/officeDocument/2006/relationships" xmlns:p="http://schemas.openxmlformats.org/presentationml/2006/main">
+  <p:cSld>
+    <p:spTree>
+      <p:nvGrpSpPr>
+        <p:cNvPr id="1" name=""/>
+        <p:cNvGrpSpPr/>
+        <p:nvPr/>
+      </p:nvGrpSpPr>
+      <p:grpSpPr>
+        <a:xfrm>
+          <a:off x="0" y="0"/>
+          <a:ext cx="0" cy="0"/>
+          <a:chOff x="0" y="0"/>
+          <a:chExt cx="0" cy="0"/>
+        </a:xfrm>
+      </p:grpSpPr>
+      <p:sp>
+        <p:nvSpPr>
+          <p:cNvPr id="2" name="Título 1"/>
+          <p:cNvSpPr>
+            <a:spLocks noGrp="1"/>
+          </p:cNvSpPr>
+          <p:nvPr>
+            <p:ph type="title"/>
+          </p:nvPr>
+        </p:nvSpPr>
         <p:spPr/>
         <p:txBody>
           <a:bodyPr/>
@@ -3467,6 +3965,898 @@
     <p:extLst>
       <p:ext uri="{BB962C8B-B14F-4D97-AF65-F5344CB8AC3E}">
         <p14:creationId xmlns:p14="http://schemas.microsoft.com/office/powerpoint/2010/main" val="2270348545"/>
+      </p:ext>
+    </p:extLst>
+  </p:cSld>
+  <p:clrMapOvr>
+    <a:masterClrMapping/>
+  </p:clrMapOvr>
+  <p:timing>
+    <p:tnLst>
+      <p:par>
+        <p:cTn id="1" dur="indefinite" restart="never" nodeType="tmRoot"/>
+      </p:par>
+    </p:tnLst>
+  </p:timing>
+</p:sld>
+</file>
+
+<file path=ppt/slides/slide15.xml><?xml version="1.0" encoding="utf-8"?>
+<p:sld xmlns:a="http://schemas.openxmlformats.org/drawingml/2006/main" xmlns:r="http://schemas.openxmlformats.org/officeDocument/2006/relationships" xmlns:p="http://schemas.openxmlformats.org/presentationml/2006/main">
+  <p:cSld>
+    <p:spTree>
+      <p:nvGrpSpPr>
+        <p:cNvPr id="1" name=""/>
+        <p:cNvGrpSpPr/>
+        <p:nvPr/>
+      </p:nvGrpSpPr>
+      <p:grpSpPr>
+        <a:xfrm>
+          <a:off x="0" y="0"/>
+          <a:ext cx="0" cy="0"/>
+          <a:chOff x="0" y="0"/>
+          <a:chExt cx="0" cy="0"/>
+        </a:xfrm>
+      </p:grpSpPr>
+      <p:sp>
+        <p:nvSpPr>
+          <p:cNvPr id="2" name="1 Título"/>
+          <p:cNvSpPr>
+            <a:spLocks noGrp="1"/>
+          </p:cNvSpPr>
+          <p:nvPr>
+            <p:ph type="title"/>
+          </p:nvPr>
+        </p:nvSpPr>
+        <p:spPr/>
+        <p:txBody>
+          <a:bodyPr/>
+          <a:lstStyle/>
+          <a:p>
+            <a:r>
+              <a:rPr lang="es-MX" dirty="0" smtClean="0"/>
+              <a:t>Los dos componentes de la teoría</a:t>
+            </a:r>
+            <a:endParaRPr lang="es-MX" dirty="0"/>
+          </a:p>
+        </p:txBody>
+      </p:sp>
+      <p:sp>
+        <p:nvSpPr>
+          <p:cNvPr id="3" name="2 Marcador de contenido"/>
+          <p:cNvSpPr>
+            <a:spLocks noGrp="1"/>
+          </p:cNvSpPr>
+          <p:nvPr>
+            <p:ph idx="1"/>
+          </p:nvPr>
+        </p:nvSpPr>
+        <p:spPr/>
+        <p:txBody>
+          <a:bodyPr/>
+          <a:lstStyle/>
+          <a:p>
+            <a:r>
+              <a:rPr lang="es-MX" dirty="0" smtClean="0"/>
+              <a:t>La </a:t>
+            </a:r>
+            <a:r>
+              <a:rPr lang="es-MX" dirty="0" smtClean="0">
+                <a:solidFill>
+                  <a:srgbClr val="7030A0"/>
+                </a:solidFill>
+              </a:rPr>
+              <a:t>Discriminabilidad</a:t>
+            </a:r>
+          </a:p>
+          <a:p>
+            <a:pPr lvl="1"/>
+            <a:r>
+              <a:rPr lang="es-MX" dirty="0" smtClean="0">
+                <a:solidFill>
+                  <a:srgbClr val="7030A0"/>
+                </a:solidFill>
+              </a:rPr>
+              <a:t>D’</a:t>
+            </a:r>
+          </a:p>
+          <a:p>
+            <a:endParaRPr lang="es-MX" dirty="0"/>
+          </a:p>
+          <a:p>
+            <a:endParaRPr lang="es-MX" dirty="0" smtClean="0"/>
+          </a:p>
+          <a:p>
+            <a:r>
+              <a:rPr lang="es-MX" dirty="0" smtClean="0"/>
+              <a:t>El </a:t>
+            </a:r>
+            <a:r>
+              <a:rPr lang="es-MX" dirty="0" smtClean="0">
+                <a:solidFill>
+                  <a:srgbClr val="00B0F0"/>
+                </a:solidFill>
+              </a:rPr>
+              <a:t>Sesgo</a:t>
+            </a:r>
+          </a:p>
+          <a:p>
+            <a:pPr lvl="1"/>
+            <a:r>
+              <a:rPr lang="es-MX" dirty="0" smtClean="0">
+                <a:solidFill>
+                  <a:srgbClr val="00B0F0"/>
+                </a:solidFill>
+              </a:rPr>
+              <a:t>Beta</a:t>
+            </a:r>
+          </a:p>
+          <a:p>
+            <a:pPr lvl="1"/>
+            <a:r>
+              <a:rPr lang="es-MX" dirty="0">
+                <a:solidFill>
+                  <a:srgbClr val="00B0F0"/>
+                </a:solidFill>
+              </a:rPr>
+              <a:t>C</a:t>
+            </a:r>
+          </a:p>
+        </p:txBody>
+      </p:sp>
+    </p:spTree>
+    <p:extLst>
+      <p:ext uri="{BB962C8B-B14F-4D97-AF65-F5344CB8AC3E}">
+        <p14:creationId xmlns:p14="http://schemas.microsoft.com/office/powerpoint/2010/main" val="472038531"/>
+      </p:ext>
+    </p:extLst>
+  </p:cSld>
+  <p:clrMapOvr>
+    <a:masterClrMapping/>
+  </p:clrMapOvr>
+  <p:timing>
+    <p:tnLst>
+      <p:par>
+        <p:cTn id="1" dur="indefinite" restart="never" nodeType="tmRoot"/>
+      </p:par>
+    </p:tnLst>
+  </p:timing>
+</p:sld>
+</file>
+
+<file path=ppt/slides/slide16.xml><?xml version="1.0" encoding="utf-8"?>
+<p:sld xmlns:a="http://schemas.openxmlformats.org/drawingml/2006/main" xmlns:r="http://schemas.openxmlformats.org/officeDocument/2006/relationships" xmlns:p="http://schemas.openxmlformats.org/presentationml/2006/main">
+  <p:cSld>
+    <p:spTree>
+      <p:nvGrpSpPr>
+        <p:cNvPr id="1" name=""/>
+        <p:cNvGrpSpPr/>
+        <p:nvPr/>
+      </p:nvGrpSpPr>
+      <p:grpSpPr>
+        <a:xfrm>
+          <a:off x="0" y="0"/>
+          <a:ext cx="0" cy="0"/>
+          <a:chOff x="0" y="0"/>
+          <a:chExt cx="0" cy="0"/>
+        </a:xfrm>
+      </p:grpSpPr>
+      <p:sp>
+        <p:nvSpPr>
+          <p:cNvPr id="4" name="Título 3"/>
+          <p:cNvSpPr>
+            <a:spLocks noGrp="1"/>
+          </p:cNvSpPr>
+          <p:nvPr>
+            <p:ph type="title"/>
+          </p:nvPr>
+        </p:nvSpPr>
+        <p:spPr>
+          <a:xfrm>
+            <a:off x="709411" y="0"/>
+            <a:ext cx="10515600" cy="1325563"/>
+          </a:xfrm>
+        </p:spPr>
+        <p:txBody>
+          <a:bodyPr/>
+          <a:lstStyle/>
+          <a:p>
+            <a:pPr algn="ctr"/>
+            <a:r>
+              <a:rPr lang="es-MX" b="1" dirty="0" smtClean="0">
+                <a:effectLst>
+                  <a:outerShdw blurRad="38100" dist="38100" dir="2700000" algn="tl">
+                    <a:srgbClr val="000000">
+                      <a:alpha val="43137"/>
+                    </a:srgbClr>
+                  </a:outerShdw>
+                </a:effectLst>
+              </a:rPr>
+              <a:t>Teoría de Detección de Señales</a:t>
+            </a:r>
+            <a:endParaRPr lang="es-MX" b="1" dirty="0">
+              <a:effectLst>
+                <a:outerShdw blurRad="38100" dist="38100" dir="2700000" algn="tl">
+                  <a:srgbClr val="000000">
+                    <a:alpha val="43137"/>
+                  </a:srgbClr>
+                </a:outerShdw>
+              </a:effectLst>
+            </a:endParaRPr>
+          </a:p>
+        </p:txBody>
+      </p:sp>
+      <p:sp>
+        <p:nvSpPr>
+          <p:cNvPr id="5" name="Marcador de contenido 4"/>
+          <p:cNvSpPr>
+            <a:spLocks noGrp="1"/>
+          </p:cNvSpPr>
+          <p:nvPr>
+            <p:ph sz="half" idx="1"/>
+          </p:nvPr>
+        </p:nvSpPr>
+        <p:spPr>
+          <a:xfrm>
+            <a:off x="284409" y="1220318"/>
+            <a:ext cx="5575478" cy="4351338"/>
+          </a:xfrm>
+        </p:spPr>
+        <p:txBody>
+          <a:bodyPr/>
+          <a:lstStyle/>
+          <a:p>
+            <a:pPr marL="0" indent="0">
+              <a:buNone/>
+            </a:pPr>
+            <a:r>
+              <a:rPr lang="es-MX" dirty="0" smtClean="0"/>
+              <a:t>1.- Hay variabilidad (incertidumbre)</a:t>
+            </a:r>
+            <a:endParaRPr lang="es-MX" b="1" dirty="0">
+              <a:effectLst>
+                <a:outerShdw blurRad="38100" dist="38100" dir="2700000" algn="tl">
+                  <a:srgbClr val="000000">
+                    <a:alpha val="43137"/>
+                  </a:srgbClr>
+                </a:outerShdw>
+              </a:effectLst>
+            </a:endParaRPr>
+          </a:p>
+        </p:txBody>
+      </p:sp>
+      <p:sp>
+        <p:nvSpPr>
+          <p:cNvPr id="6" name="Marcador de contenido 5"/>
+          <p:cNvSpPr>
+            <a:spLocks noGrp="1"/>
+          </p:cNvSpPr>
+          <p:nvPr>
+            <p:ph sz="half" idx="2"/>
+          </p:nvPr>
+        </p:nvSpPr>
+        <p:spPr>
+          <a:xfrm>
+            <a:off x="6172199" y="1220318"/>
+            <a:ext cx="6019801" cy="4351338"/>
+          </a:xfrm>
+        </p:spPr>
+        <p:txBody>
+          <a:bodyPr/>
+          <a:lstStyle/>
+          <a:p>
+            <a:pPr marL="0" indent="0">
+              <a:buNone/>
+            </a:pPr>
+            <a:r>
+              <a:rPr lang="es-MX" dirty="0" smtClean="0"/>
+              <a:t>2.- Las consecuencias importan</a:t>
+            </a:r>
+            <a:endParaRPr lang="es-MX" b="1" dirty="0">
+              <a:effectLst>
+                <a:outerShdw blurRad="38100" dist="38100" dir="2700000" algn="tl">
+                  <a:srgbClr val="000000">
+                    <a:alpha val="43137"/>
+                  </a:srgbClr>
+                </a:outerShdw>
+              </a:effectLst>
+            </a:endParaRPr>
+          </a:p>
+        </p:txBody>
+      </p:sp>
+    </p:spTree>
+    <p:extLst>
+      <p:ext uri="{BB962C8B-B14F-4D97-AF65-F5344CB8AC3E}">
+        <p14:creationId xmlns:p14="http://schemas.microsoft.com/office/powerpoint/2010/main" val="1455838192"/>
+      </p:ext>
+    </p:extLst>
+  </p:cSld>
+  <p:clrMapOvr>
+    <a:masterClrMapping/>
+  </p:clrMapOvr>
+  <p:timing>
+    <p:tnLst>
+      <p:par>
+        <p:cTn id="1" dur="indefinite" restart="never" nodeType="tmRoot"/>
+      </p:par>
+    </p:tnLst>
+  </p:timing>
+</p:sld>
+</file>
+
+<file path=ppt/slides/slide17.xml><?xml version="1.0" encoding="utf-8"?>
+<p:sld xmlns:a="http://schemas.openxmlformats.org/drawingml/2006/main" xmlns:r="http://schemas.openxmlformats.org/officeDocument/2006/relationships" xmlns:p="http://schemas.openxmlformats.org/presentationml/2006/main">
+  <p:cSld>
+    <p:spTree>
+      <p:nvGrpSpPr>
+        <p:cNvPr id="1" name=""/>
+        <p:cNvGrpSpPr/>
+        <p:nvPr/>
+      </p:nvGrpSpPr>
+      <p:grpSpPr>
+        <a:xfrm>
+          <a:off x="0" y="0"/>
+          <a:ext cx="0" cy="0"/>
+          <a:chOff x="0" y="0"/>
+          <a:chExt cx="0" cy="0"/>
+        </a:xfrm>
+      </p:grpSpPr>
+      <p:sp>
+        <p:nvSpPr>
+          <p:cNvPr id="4" name="Título 3"/>
+          <p:cNvSpPr>
+            <a:spLocks noGrp="1"/>
+          </p:cNvSpPr>
+          <p:nvPr>
+            <p:ph type="title"/>
+          </p:nvPr>
+        </p:nvSpPr>
+        <p:spPr>
+          <a:xfrm>
+            <a:off x="709411" y="0"/>
+            <a:ext cx="10515600" cy="1325563"/>
+          </a:xfrm>
+        </p:spPr>
+        <p:txBody>
+          <a:bodyPr/>
+          <a:lstStyle/>
+          <a:p>
+            <a:pPr algn="ctr"/>
+            <a:r>
+              <a:rPr lang="es-MX" b="1" dirty="0" smtClean="0">
+                <a:effectLst>
+                  <a:outerShdw blurRad="38100" dist="38100" dir="2700000" algn="tl">
+                    <a:srgbClr val="000000">
+                      <a:alpha val="43137"/>
+                    </a:srgbClr>
+                  </a:outerShdw>
+                </a:effectLst>
+              </a:rPr>
+              <a:t>Teoría de Detección de Señales</a:t>
+            </a:r>
+            <a:endParaRPr lang="es-MX" b="1" dirty="0">
+              <a:effectLst>
+                <a:outerShdw blurRad="38100" dist="38100" dir="2700000" algn="tl">
+                  <a:srgbClr val="000000">
+                    <a:alpha val="43137"/>
+                  </a:srgbClr>
+                </a:outerShdw>
+              </a:effectLst>
+            </a:endParaRPr>
+          </a:p>
+        </p:txBody>
+      </p:sp>
+      <p:sp>
+        <p:nvSpPr>
+          <p:cNvPr id="5" name="Marcador de contenido 4"/>
+          <p:cNvSpPr>
+            <a:spLocks noGrp="1"/>
+          </p:cNvSpPr>
+          <p:nvPr>
+            <p:ph sz="half" idx="1"/>
+          </p:nvPr>
+        </p:nvSpPr>
+        <p:spPr>
+          <a:xfrm>
+            <a:off x="284409" y="1220318"/>
+            <a:ext cx="5575478" cy="4351338"/>
+          </a:xfrm>
+        </p:spPr>
+        <p:txBody>
+          <a:bodyPr/>
+          <a:lstStyle/>
+          <a:p>
+            <a:pPr marL="0" indent="0">
+              <a:buNone/>
+            </a:pPr>
+            <a:r>
+              <a:rPr lang="es-MX" dirty="0" smtClean="0"/>
+              <a:t>1.- Hay variabilidad (incertidumbre)</a:t>
+            </a:r>
+            <a:endParaRPr lang="es-MX" b="1" dirty="0">
+              <a:effectLst>
+                <a:outerShdw blurRad="38100" dist="38100" dir="2700000" algn="tl">
+                  <a:srgbClr val="000000">
+                    <a:alpha val="43137"/>
+                  </a:srgbClr>
+                </a:outerShdw>
+              </a:effectLst>
+            </a:endParaRPr>
+          </a:p>
+        </p:txBody>
+      </p:sp>
+      <p:sp>
+        <p:nvSpPr>
+          <p:cNvPr id="6" name="Marcador de contenido 5"/>
+          <p:cNvSpPr>
+            <a:spLocks noGrp="1"/>
+          </p:cNvSpPr>
+          <p:nvPr>
+            <p:ph sz="half" idx="2"/>
+          </p:nvPr>
+        </p:nvSpPr>
+        <p:spPr>
+          <a:xfrm>
+            <a:off x="6172199" y="1220318"/>
+            <a:ext cx="6019801" cy="4351338"/>
+          </a:xfrm>
+        </p:spPr>
+        <p:txBody>
+          <a:bodyPr/>
+          <a:lstStyle/>
+          <a:p>
+            <a:pPr marL="0" indent="0">
+              <a:buNone/>
+            </a:pPr>
+            <a:r>
+              <a:rPr lang="es-MX" dirty="0" smtClean="0"/>
+              <a:t>2.- Las consecuencias importan</a:t>
+            </a:r>
+            <a:endParaRPr lang="es-MX" b="1" dirty="0">
+              <a:effectLst>
+                <a:outerShdw blurRad="38100" dist="38100" dir="2700000" algn="tl">
+                  <a:srgbClr val="000000">
+                    <a:alpha val="43137"/>
+                  </a:srgbClr>
+                </a:outerShdw>
+              </a:effectLst>
+            </a:endParaRPr>
+          </a:p>
+        </p:txBody>
+      </p:sp>
+      <p:pic>
+        <p:nvPicPr>
+          <p:cNvPr id="7" name="Imagen 6"/>
+          <p:cNvPicPr>
+            <a:picLocks noChangeAspect="1"/>
+          </p:cNvPicPr>
+          <p:nvPr/>
+        </p:nvPicPr>
+        <p:blipFill>
+          <a:blip r:embed="rId2"/>
+          <a:stretch>
+            <a:fillRect/>
+          </a:stretch>
+        </p:blipFill>
+        <p:spPr>
+          <a:xfrm>
+            <a:off x="709411" y="1772708"/>
+            <a:ext cx="4274713" cy="4929114"/>
+          </a:xfrm>
+          <a:prstGeom prst="rect">
+            <a:avLst/>
+          </a:prstGeom>
+        </p:spPr>
+      </p:pic>
+    </p:spTree>
+    <p:extLst>
+      <p:ext uri="{BB962C8B-B14F-4D97-AF65-F5344CB8AC3E}">
+        <p14:creationId xmlns:p14="http://schemas.microsoft.com/office/powerpoint/2010/main" val="2379869787"/>
+      </p:ext>
+    </p:extLst>
+  </p:cSld>
+  <p:clrMapOvr>
+    <a:masterClrMapping/>
+  </p:clrMapOvr>
+  <p:timing>
+    <p:tnLst>
+      <p:par>
+        <p:cTn id="1" dur="indefinite" restart="never" nodeType="tmRoot"/>
+      </p:par>
+    </p:tnLst>
+  </p:timing>
+</p:sld>
+</file>
+
+<file path=ppt/slides/slide18.xml><?xml version="1.0" encoding="utf-8"?>
+<p:sld xmlns:a="http://schemas.openxmlformats.org/drawingml/2006/main" xmlns:r="http://schemas.openxmlformats.org/officeDocument/2006/relationships" xmlns:p="http://schemas.openxmlformats.org/presentationml/2006/main">
+  <p:cSld>
+    <p:spTree>
+      <p:nvGrpSpPr>
+        <p:cNvPr id="1" name=""/>
+        <p:cNvGrpSpPr/>
+        <p:nvPr/>
+      </p:nvGrpSpPr>
+      <p:grpSpPr>
+        <a:xfrm>
+          <a:off x="0" y="0"/>
+          <a:ext cx="0" cy="0"/>
+          <a:chOff x="0" y="0"/>
+          <a:chExt cx="0" cy="0"/>
+        </a:xfrm>
+      </p:grpSpPr>
+      <p:sp>
+        <p:nvSpPr>
+          <p:cNvPr id="4" name="Título 3"/>
+          <p:cNvSpPr>
+            <a:spLocks noGrp="1"/>
+          </p:cNvSpPr>
+          <p:nvPr>
+            <p:ph type="title"/>
+          </p:nvPr>
+        </p:nvSpPr>
+        <p:spPr>
+          <a:xfrm>
+            <a:off x="709411" y="0"/>
+            <a:ext cx="10515600" cy="1325563"/>
+          </a:xfrm>
+        </p:spPr>
+        <p:txBody>
+          <a:bodyPr/>
+          <a:lstStyle/>
+          <a:p>
+            <a:pPr algn="ctr"/>
+            <a:r>
+              <a:rPr lang="es-MX" b="1" dirty="0" smtClean="0">
+                <a:effectLst>
+                  <a:outerShdw blurRad="38100" dist="38100" dir="2700000" algn="tl">
+                    <a:srgbClr val="000000">
+                      <a:alpha val="43137"/>
+                    </a:srgbClr>
+                  </a:outerShdw>
+                </a:effectLst>
+              </a:rPr>
+              <a:t>Teoría de Detección de Señales</a:t>
+            </a:r>
+            <a:endParaRPr lang="es-MX" b="1" dirty="0">
+              <a:effectLst>
+                <a:outerShdw blurRad="38100" dist="38100" dir="2700000" algn="tl">
+                  <a:srgbClr val="000000">
+                    <a:alpha val="43137"/>
+                  </a:srgbClr>
+                </a:outerShdw>
+              </a:effectLst>
+            </a:endParaRPr>
+          </a:p>
+        </p:txBody>
+      </p:sp>
+      <p:sp>
+        <p:nvSpPr>
+          <p:cNvPr id="5" name="Marcador de contenido 4"/>
+          <p:cNvSpPr>
+            <a:spLocks noGrp="1"/>
+          </p:cNvSpPr>
+          <p:nvPr>
+            <p:ph sz="half" idx="1"/>
+          </p:nvPr>
+        </p:nvSpPr>
+        <p:spPr>
+          <a:xfrm>
+            <a:off x="284409" y="1220318"/>
+            <a:ext cx="5575478" cy="4351338"/>
+          </a:xfrm>
+        </p:spPr>
+        <p:txBody>
+          <a:bodyPr/>
+          <a:lstStyle/>
+          <a:p>
+            <a:pPr marL="0" indent="0">
+              <a:buNone/>
+            </a:pPr>
+            <a:r>
+              <a:rPr lang="es-MX" dirty="0" smtClean="0"/>
+              <a:t>1.- Hay variabilidad (incertidumbre)</a:t>
+            </a:r>
+            <a:endParaRPr lang="es-MX" b="1" dirty="0">
+              <a:effectLst>
+                <a:outerShdw blurRad="38100" dist="38100" dir="2700000" algn="tl">
+                  <a:srgbClr val="000000">
+                    <a:alpha val="43137"/>
+                  </a:srgbClr>
+                </a:outerShdw>
+              </a:effectLst>
+            </a:endParaRPr>
+          </a:p>
+        </p:txBody>
+      </p:sp>
+      <p:sp>
+        <p:nvSpPr>
+          <p:cNvPr id="6" name="Marcador de contenido 5"/>
+          <p:cNvSpPr>
+            <a:spLocks noGrp="1"/>
+          </p:cNvSpPr>
+          <p:nvPr>
+            <p:ph sz="half" idx="2"/>
+          </p:nvPr>
+        </p:nvSpPr>
+        <p:spPr>
+          <a:xfrm>
+            <a:off x="6172199" y="1220318"/>
+            <a:ext cx="6019801" cy="4351338"/>
+          </a:xfrm>
+        </p:spPr>
+        <p:txBody>
+          <a:bodyPr/>
+          <a:lstStyle/>
+          <a:p>
+            <a:pPr marL="0" indent="0">
+              <a:buNone/>
+            </a:pPr>
+            <a:r>
+              <a:rPr lang="es-MX" dirty="0" smtClean="0"/>
+              <a:t>2.- Las consecuencias importan</a:t>
+            </a:r>
+            <a:endParaRPr lang="es-MX" b="1" dirty="0">
+              <a:effectLst>
+                <a:outerShdw blurRad="38100" dist="38100" dir="2700000" algn="tl">
+                  <a:srgbClr val="000000">
+                    <a:alpha val="43137"/>
+                  </a:srgbClr>
+                </a:outerShdw>
+              </a:effectLst>
+            </a:endParaRPr>
+          </a:p>
+        </p:txBody>
+      </p:sp>
+      <p:pic>
+        <p:nvPicPr>
+          <p:cNvPr id="7" name="Imagen 6"/>
+          <p:cNvPicPr>
+            <a:picLocks noChangeAspect="1"/>
+          </p:cNvPicPr>
+          <p:nvPr/>
+        </p:nvPicPr>
+        <p:blipFill>
+          <a:blip r:embed="rId2"/>
+          <a:stretch>
+            <a:fillRect/>
+          </a:stretch>
+        </p:blipFill>
+        <p:spPr>
+          <a:xfrm>
+            <a:off x="709411" y="1772708"/>
+            <a:ext cx="4274713" cy="4929114"/>
+          </a:xfrm>
+          <a:prstGeom prst="rect">
+            <a:avLst/>
+          </a:prstGeom>
+        </p:spPr>
+      </p:pic>
+      <p:pic>
+        <p:nvPicPr>
+          <p:cNvPr id="2" name="Imagen 1"/>
+          <p:cNvPicPr>
+            <a:picLocks noChangeAspect="1"/>
+          </p:cNvPicPr>
+          <p:nvPr/>
+        </p:nvPicPr>
+        <p:blipFill>
+          <a:blip r:embed="rId3"/>
+          <a:stretch>
+            <a:fillRect/>
+          </a:stretch>
+        </p:blipFill>
+        <p:spPr>
+          <a:xfrm>
+            <a:off x="5859887" y="2125014"/>
+            <a:ext cx="5996490" cy="3662721"/>
+          </a:xfrm>
+          <a:prstGeom prst="rect">
+            <a:avLst/>
+          </a:prstGeom>
+        </p:spPr>
+      </p:pic>
+    </p:spTree>
+    <p:extLst>
+      <p:ext uri="{BB962C8B-B14F-4D97-AF65-F5344CB8AC3E}">
+        <p14:creationId xmlns:p14="http://schemas.microsoft.com/office/powerpoint/2010/main" val="1712786140"/>
+      </p:ext>
+    </p:extLst>
+  </p:cSld>
+  <p:clrMapOvr>
+    <a:masterClrMapping/>
+  </p:clrMapOvr>
+  <p:timing>
+    <p:tnLst>
+      <p:par>
+        <p:cTn id="1" dur="indefinite" restart="never" nodeType="tmRoot"/>
+      </p:par>
+    </p:tnLst>
+  </p:timing>
+</p:sld>
+</file>
+
+<file path=ppt/slides/slide19.xml><?xml version="1.0" encoding="utf-8"?>
+<p:sld xmlns:a="http://schemas.openxmlformats.org/drawingml/2006/main" xmlns:r="http://schemas.openxmlformats.org/officeDocument/2006/relationships" xmlns:p="http://schemas.openxmlformats.org/presentationml/2006/main">
+  <p:cSld>
+    <p:spTree>
+      <p:nvGrpSpPr>
+        <p:cNvPr id="1" name=""/>
+        <p:cNvGrpSpPr/>
+        <p:nvPr/>
+      </p:nvGrpSpPr>
+      <p:grpSpPr>
+        <a:xfrm>
+          <a:off x="0" y="0"/>
+          <a:ext cx="0" cy="0"/>
+          <a:chOff x="0" y="0"/>
+          <a:chExt cx="0" cy="0"/>
+        </a:xfrm>
+      </p:grpSpPr>
+      <p:sp>
+        <p:nvSpPr>
+          <p:cNvPr id="2" name="Título 1"/>
+          <p:cNvSpPr>
+            <a:spLocks noGrp="1"/>
+          </p:cNvSpPr>
+          <p:nvPr>
+            <p:ph type="title"/>
+          </p:nvPr>
+        </p:nvSpPr>
+        <p:spPr/>
+        <p:txBody>
+          <a:bodyPr/>
+          <a:lstStyle/>
+          <a:p>
+            <a:r>
+              <a:rPr lang="es-MX" dirty="0" smtClean="0"/>
+              <a:t/>
+            </a:r>
+            <a:br>
+              <a:rPr lang="es-MX" dirty="0" smtClean="0"/>
+            </a:br>
+            <a:endParaRPr lang="es-MX" dirty="0"/>
+          </a:p>
+        </p:txBody>
+      </p:sp>
+      <p:sp>
+        <p:nvSpPr>
+          <p:cNvPr id="3" name="Marcador de contenido 2"/>
+          <p:cNvSpPr>
+            <a:spLocks noGrp="1"/>
+          </p:cNvSpPr>
+          <p:nvPr>
+            <p:ph sz="half" idx="1"/>
+          </p:nvPr>
+        </p:nvSpPr>
+        <p:spPr/>
+        <p:txBody>
+          <a:bodyPr/>
+          <a:lstStyle/>
+          <a:p>
+            <a:endParaRPr lang="es-MX" dirty="0" smtClean="0"/>
+          </a:p>
+          <a:p>
+            <a:endParaRPr lang="es-MX" dirty="0"/>
+          </a:p>
+        </p:txBody>
+      </p:sp>
+      <p:sp>
+        <p:nvSpPr>
+          <p:cNvPr id="4" name="Marcador de contenido 3"/>
+          <p:cNvSpPr>
+            <a:spLocks noGrp="1"/>
+          </p:cNvSpPr>
+          <p:nvPr>
+            <p:ph sz="half" idx="2"/>
+          </p:nvPr>
+        </p:nvSpPr>
+        <p:spPr/>
+        <p:txBody>
+          <a:bodyPr/>
+          <a:lstStyle/>
+          <a:p>
+            <a:endParaRPr lang="es-MX" dirty="0" smtClean="0"/>
+          </a:p>
+          <a:p>
+            <a:endParaRPr lang="es-MX" dirty="0"/>
+          </a:p>
+        </p:txBody>
+      </p:sp>
+      <p:sp>
+        <p:nvSpPr>
+          <p:cNvPr id="5" name="Título 3"/>
+          <p:cNvSpPr txBox="1">
+            <a:spLocks/>
+          </p:cNvSpPr>
+          <p:nvPr/>
+        </p:nvSpPr>
+        <p:spPr>
+          <a:xfrm>
+            <a:off x="709411" y="0"/>
+            <a:ext cx="10515600" cy="1325563"/>
+          </a:xfrm>
+          <a:prstGeom prst="rect">
+            <a:avLst/>
+          </a:prstGeom>
+        </p:spPr>
+        <p:txBody>
+          <a:bodyPr vert="horz" lIns="91440" tIns="45720" rIns="91440" bIns="45720" rtlCol="0" anchor="ctr">
+            <a:normAutofit/>
+          </a:bodyPr>
+          <a:lstStyle>
+            <a:lvl1pPr algn="l" defTabSz="914400" rtl="0" eaLnBrk="1" latinLnBrk="0" hangingPunct="1">
+              <a:lnSpc>
+                <a:spcPct val="90000"/>
+              </a:lnSpc>
+              <a:spcBef>
+                <a:spcPct val="0"/>
+              </a:spcBef>
+              <a:buNone/>
+              <a:defRPr sz="4400" kern="1200">
+                <a:solidFill>
+                  <a:schemeClr val="tx1"/>
+                </a:solidFill>
+                <a:latin typeface="+mj-lt"/>
+                <a:ea typeface="+mj-ea"/>
+                <a:cs typeface="+mj-cs"/>
+              </a:defRPr>
+            </a:lvl1pPr>
+          </a:lstStyle>
+          <a:p>
+            <a:pPr algn="ctr"/>
+            <a:r>
+              <a:rPr lang="es-MX" b="1" smtClean="0">
+                <a:effectLst>
+                  <a:outerShdw blurRad="38100" dist="38100" dir="2700000" algn="tl">
+                    <a:srgbClr val="000000">
+                      <a:alpha val="43137"/>
+                    </a:srgbClr>
+                  </a:outerShdw>
+                </a:effectLst>
+              </a:rPr>
+              <a:t>Teoría de Detección de Señales</a:t>
+            </a:r>
+            <a:endParaRPr lang="es-MX" b="1" dirty="0">
+              <a:effectLst>
+                <a:outerShdw blurRad="38100" dist="38100" dir="2700000" algn="tl">
+                  <a:srgbClr val="000000">
+                    <a:alpha val="43137"/>
+                  </a:srgbClr>
+                </a:outerShdw>
+              </a:effectLst>
+            </a:endParaRPr>
+          </a:p>
+        </p:txBody>
+      </p:sp>
+      <p:pic>
+        <p:nvPicPr>
+          <p:cNvPr id="6" name="Imagen 5"/>
+          <p:cNvPicPr>
+            <a:picLocks noChangeAspect="1"/>
+          </p:cNvPicPr>
+          <p:nvPr/>
+        </p:nvPicPr>
+        <p:blipFill>
+          <a:blip r:embed="rId2"/>
+          <a:stretch>
+            <a:fillRect/>
+          </a:stretch>
+        </p:blipFill>
+        <p:spPr>
+          <a:xfrm>
+            <a:off x="567444" y="2055813"/>
+            <a:ext cx="5133975" cy="3248025"/>
+          </a:xfrm>
+          <a:prstGeom prst="rect">
+            <a:avLst/>
+          </a:prstGeom>
+        </p:spPr>
+      </p:pic>
+    </p:spTree>
+    <p:extLst>
+      <p:ext uri="{BB962C8B-B14F-4D97-AF65-F5344CB8AC3E}">
+        <p14:creationId xmlns:p14="http://schemas.microsoft.com/office/powerpoint/2010/main" val="1748348868"/>
       </p:ext>
     </p:extLst>
   </p:cSld>
@@ -3502,7 +4892,7 @@
       </p:grpSpPr>
       <p:sp>
         <p:nvSpPr>
-          <p:cNvPr id="2" name="Título 1"/>
+          <p:cNvPr id="2" name="1 Título"/>
           <p:cNvSpPr>
             <a:spLocks noGrp="1"/>
           </p:cNvSpPr>
@@ -3517,7 +4907,7 @@
           <a:p>
             <a:r>
               <a:rPr lang="es-MX" b="1" dirty="0" smtClean="0"/>
-              <a:t>El mundo está cargado de ruido e incertidumbre….</a:t>
+              <a:t>El problema de la Detección</a:t>
             </a:r>
             <a:endParaRPr lang="es-MX" b="1" dirty="0"/>
           </a:p>
@@ -3525,7 +4915,7 @@
       </p:sp>
       <p:sp>
         <p:nvSpPr>
-          <p:cNvPr id="3" name="Marcador de contenido 2"/>
+          <p:cNvPr id="4" name="3 Marcador de contenido"/>
           <p:cNvSpPr>
             <a:spLocks noGrp="1"/>
           </p:cNvSpPr>
@@ -3535,57 +4925,689 @@
         </p:nvSpPr>
         <p:spPr/>
         <p:txBody>
-          <a:bodyPr/>
-          <a:lstStyle/>
-          <a:p>
-            <a:pPr marL="0" indent="0">
-              <a:buNone/>
-            </a:pPr>
-            <a:endParaRPr lang="es-MX" dirty="0" smtClean="0"/>
-          </a:p>
-          <a:p>
-            <a:pPr marL="0" indent="0">
-              <a:buNone/>
-            </a:pPr>
+          <a:bodyPr>
+            <a:normAutofit/>
+          </a:bodyPr>
+          <a:lstStyle/>
+          <a:p>
+            <a:r>
+              <a:rPr lang="es-MX" dirty="0" smtClean="0"/>
+              <a:t>¿Está </a:t>
+            </a:r>
+            <a:r>
+              <a:rPr lang="es-MX" i="1" dirty="0" smtClean="0">
+                <a:solidFill>
+                  <a:schemeClr val="accent1">
+                    <a:lumMod val="50000"/>
+                  </a:schemeClr>
+                </a:solidFill>
+              </a:rPr>
+              <a:t>esta situación particular </a:t>
+            </a:r>
+            <a:r>
+              <a:rPr lang="es-MX" dirty="0" smtClean="0"/>
+              <a:t>ocurriendo?</a:t>
+            </a:r>
+          </a:p>
+          <a:p>
+            <a:pPr lvl="1"/>
+            <a:r>
+              <a:rPr lang="es-MX" dirty="0" smtClean="0">
+                <a:solidFill>
+                  <a:schemeClr val="accent1">
+                    <a:lumMod val="50000"/>
+                  </a:schemeClr>
+                </a:solidFill>
+              </a:rPr>
+              <a:t>Estímulo particular</a:t>
+            </a:r>
+          </a:p>
+          <a:p>
+            <a:pPr lvl="1"/>
+            <a:r>
+              <a:rPr lang="es-MX" dirty="0" smtClean="0">
+                <a:solidFill>
+                  <a:schemeClr val="accent1">
+                    <a:lumMod val="50000"/>
+                  </a:schemeClr>
+                </a:solidFill>
+              </a:rPr>
+              <a:t>Categoría de estímulos</a:t>
+            </a:r>
+          </a:p>
+          <a:p>
+            <a:pPr lvl="1"/>
+            <a:r>
+              <a:rPr lang="es-MX" dirty="0" smtClean="0">
+                <a:solidFill>
+                  <a:schemeClr val="accent1">
+                    <a:lumMod val="50000"/>
+                  </a:schemeClr>
+                </a:solidFill>
+              </a:rPr>
+              <a:t>Estado del mundo</a:t>
+            </a:r>
+          </a:p>
+          <a:p>
             <a:endParaRPr lang="es-MX" dirty="0"/>
           </a:p>
           <a:p>
-            <a:pPr marL="0" indent="0" algn="r">
-              <a:buNone/>
-            </a:pPr>
             <a:r>
               <a:rPr lang="es-MX" dirty="0" smtClean="0"/>
-              <a:t>Uno de los problemas más frecuentes a los que se enfrentan los organismos es la detección de estados o eventos específicos (</a:t>
-            </a:r>
-            <a:r>
-              <a:rPr lang="es-MX" b="1" dirty="0" smtClean="0"/>
-              <a:t>señales</a:t>
-            </a:r>
-            <a:r>
-              <a:rPr lang="es-MX" dirty="0" smtClean="0"/>
-              <a:t>) que les proporcionen información relevante sobre el estado del mundo (</a:t>
-            </a:r>
-            <a:r>
-              <a:rPr lang="es-MX" dirty="0" err="1" smtClean="0"/>
-              <a:t>McNicol</a:t>
-            </a:r>
-            <a:r>
-              <a:rPr lang="es-MX" dirty="0" smtClean="0"/>
-              <a:t>, 2005).</a:t>
-            </a:r>
-          </a:p>
-          <a:p>
-            <a:pPr marL="0" indent="0">
-              <a:buNone/>
-            </a:pPr>
-            <a:endParaRPr lang="es-MX" dirty="0" smtClean="0"/>
+              <a:t>Pregunta ‘Sí/No’</a:t>
+            </a:r>
+            <a:endParaRPr lang="es-MX" dirty="0"/>
           </a:p>
         </p:txBody>
       </p:sp>
     </p:spTree>
     <p:extLst>
       <p:ext uri="{BB962C8B-B14F-4D97-AF65-F5344CB8AC3E}">
-        <p14:creationId xmlns:p14="http://schemas.microsoft.com/office/powerpoint/2010/main" val="3458915282"/>
+        <p14:creationId xmlns:p14="http://schemas.microsoft.com/office/powerpoint/2010/main" val="2133018348"/>
+      </p:ext>
+    </p:extLst>
+  </p:cSld>
+  <p:clrMapOvr>
+    <a:masterClrMapping/>
+  </p:clrMapOvr>
+  <p:timing>
+    <p:tnLst>
+      <p:par>
+        <p:cTn id="1" dur="indefinite" restart="never" nodeType="tmRoot"/>
+      </p:par>
+    </p:tnLst>
+  </p:timing>
+</p:sld>
+</file>
+
+<file path=ppt/slides/slide20.xml><?xml version="1.0" encoding="utf-8"?>
+<p:sld xmlns:a="http://schemas.openxmlformats.org/drawingml/2006/main" xmlns:r="http://schemas.openxmlformats.org/officeDocument/2006/relationships" xmlns:p="http://schemas.openxmlformats.org/presentationml/2006/main">
+  <p:cSld>
+    <p:spTree>
+      <p:nvGrpSpPr>
+        <p:cNvPr id="1" name=""/>
+        <p:cNvGrpSpPr/>
+        <p:nvPr/>
+      </p:nvGrpSpPr>
+      <p:grpSpPr>
+        <a:xfrm>
+          <a:off x="0" y="0"/>
+          <a:ext cx="0" cy="0"/>
+          <a:chOff x="0" y="0"/>
+          <a:chExt cx="0" cy="0"/>
+        </a:xfrm>
+      </p:grpSpPr>
+      <p:sp>
+        <p:nvSpPr>
+          <p:cNvPr id="2" name="Título 1"/>
+          <p:cNvSpPr>
+            <a:spLocks noGrp="1"/>
+          </p:cNvSpPr>
+          <p:nvPr>
+            <p:ph type="title"/>
+          </p:nvPr>
+        </p:nvSpPr>
+        <p:spPr/>
+        <p:txBody>
+          <a:bodyPr/>
+          <a:lstStyle/>
+          <a:p>
+            <a:r>
+              <a:rPr lang="es-MX" dirty="0" smtClean="0"/>
+              <a:t/>
+            </a:r>
+            <a:br>
+              <a:rPr lang="es-MX" dirty="0" smtClean="0"/>
+            </a:br>
+            <a:endParaRPr lang="es-MX" dirty="0"/>
+          </a:p>
+        </p:txBody>
+      </p:sp>
+      <p:sp>
+        <p:nvSpPr>
+          <p:cNvPr id="3" name="Marcador de contenido 2"/>
+          <p:cNvSpPr>
+            <a:spLocks noGrp="1"/>
+          </p:cNvSpPr>
+          <p:nvPr>
+            <p:ph sz="half" idx="1"/>
+          </p:nvPr>
+        </p:nvSpPr>
+        <p:spPr/>
+        <p:txBody>
+          <a:bodyPr/>
+          <a:lstStyle/>
+          <a:p>
+            <a:endParaRPr lang="es-MX" dirty="0" smtClean="0"/>
+          </a:p>
+          <a:p>
+            <a:endParaRPr lang="es-MX" dirty="0"/>
+          </a:p>
+        </p:txBody>
+      </p:sp>
+      <p:sp>
+        <p:nvSpPr>
+          <p:cNvPr id="4" name="Marcador de contenido 3"/>
+          <p:cNvSpPr>
+            <a:spLocks noGrp="1"/>
+          </p:cNvSpPr>
+          <p:nvPr>
+            <p:ph sz="half" idx="2"/>
+          </p:nvPr>
+        </p:nvSpPr>
+        <p:spPr/>
+        <p:txBody>
+          <a:bodyPr/>
+          <a:lstStyle/>
+          <a:p>
+            <a:endParaRPr lang="es-MX" dirty="0" smtClean="0"/>
+          </a:p>
+          <a:p>
+            <a:endParaRPr lang="es-MX" dirty="0"/>
+          </a:p>
+        </p:txBody>
+      </p:sp>
+      <p:sp>
+        <p:nvSpPr>
+          <p:cNvPr id="5" name="Título 3"/>
+          <p:cNvSpPr txBox="1">
+            <a:spLocks/>
+          </p:cNvSpPr>
+          <p:nvPr/>
+        </p:nvSpPr>
+        <p:spPr>
+          <a:xfrm>
+            <a:off x="709411" y="0"/>
+            <a:ext cx="10515600" cy="1325563"/>
+          </a:xfrm>
+          <a:prstGeom prst="rect">
+            <a:avLst/>
+          </a:prstGeom>
+        </p:spPr>
+        <p:txBody>
+          <a:bodyPr vert="horz" lIns="91440" tIns="45720" rIns="91440" bIns="45720" rtlCol="0" anchor="ctr">
+            <a:normAutofit/>
+          </a:bodyPr>
+          <a:lstStyle>
+            <a:lvl1pPr algn="l" defTabSz="914400" rtl="0" eaLnBrk="1" latinLnBrk="0" hangingPunct="1">
+              <a:lnSpc>
+                <a:spcPct val="90000"/>
+              </a:lnSpc>
+              <a:spcBef>
+                <a:spcPct val="0"/>
+              </a:spcBef>
+              <a:buNone/>
+              <a:defRPr sz="4400" kern="1200">
+                <a:solidFill>
+                  <a:schemeClr val="tx1"/>
+                </a:solidFill>
+                <a:latin typeface="+mj-lt"/>
+                <a:ea typeface="+mj-ea"/>
+                <a:cs typeface="+mj-cs"/>
+              </a:defRPr>
+            </a:lvl1pPr>
+          </a:lstStyle>
+          <a:p>
+            <a:pPr algn="ctr"/>
+            <a:r>
+              <a:rPr lang="es-MX" b="1" smtClean="0">
+                <a:effectLst>
+                  <a:outerShdw blurRad="38100" dist="38100" dir="2700000" algn="tl">
+                    <a:srgbClr val="000000">
+                      <a:alpha val="43137"/>
+                    </a:srgbClr>
+                  </a:outerShdw>
+                </a:effectLst>
+              </a:rPr>
+              <a:t>Teoría de Detección de Señales</a:t>
+            </a:r>
+            <a:endParaRPr lang="es-MX" b="1" dirty="0">
+              <a:effectLst>
+                <a:outerShdw blurRad="38100" dist="38100" dir="2700000" algn="tl">
+                  <a:srgbClr val="000000">
+                    <a:alpha val="43137"/>
+                  </a:srgbClr>
+                </a:outerShdw>
+              </a:effectLst>
+            </a:endParaRPr>
+          </a:p>
+        </p:txBody>
+      </p:sp>
+      <p:pic>
+        <p:nvPicPr>
+          <p:cNvPr id="6" name="Imagen 5"/>
+          <p:cNvPicPr>
+            <a:picLocks noChangeAspect="1"/>
+          </p:cNvPicPr>
+          <p:nvPr/>
+        </p:nvPicPr>
+        <p:blipFill>
+          <a:blip r:embed="rId2"/>
+          <a:stretch>
+            <a:fillRect/>
+          </a:stretch>
+        </p:blipFill>
+        <p:spPr>
+          <a:xfrm>
+            <a:off x="567444" y="2055813"/>
+            <a:ext cx="5133975" cy="3248025"/>
+          </a:xfrm>
+          <a:prstGeom prst="rect">
+            <a:avLst/>
+          </a:prstGeom>
+        </p:spPr>
+      </p:pic>
+      <p:pic>
+        <p:nvPicPr>
+          <p:cNvPr id="8" name="Imagen 7"/>
+          <p:cNvPicPr>
+            <a:picLocks noChangeAspect="1"/>
+          </p:cNvPicPr>
+          <p:nvPr/>
+        </p:nvPicPr>
+        <p:blipFill>
+          <a:blip r:embed="rId3"/>
+          <a:stretch>
+            <a:fillRect/>
+          </a:stretch>
+        </p:blipFill>
+        <p:spPr>
+          <a:xfrm>
+            <a:off x="5859887" y="2125014"/>
+            <a:ext cx="5996490" cy="3662721"/>
+          </a:xfrm>
+          <a:prstGeom prst="rect">
+            <a:avLst/>
+          </a:prstGeom>
+        </p:spPr>
+      </p:pic>
+    </p:spTree>
+    <p:extLst>
+      <p:ext uri="{BB962C8B-B14F-4D97-AF65-F5344CB8AC3E}">
+        <p14:creationId xmlns:p14="http://schemas.microsoft.com/office/powerpoint/2010/main" val="580518004"/>
+      </p:ext>
+    </p:extLst>
+  </p:cSld>
+  <p:clrMapOvr>
+    <a:masterClrMapping/>
+  </p:clrMapOvr>
+  <p:timing>
+    <p:tnLst>
+      <p:par>
+        <p:cTn id="1" dur="indefinite" restart="never" nodeType="tmRoot"/>
+      </p:par>
+    </p:tnLst>
+  </p:timing>
+</p:sld>
+</file>
+
+<file path=ppt/slides/slide21.xml><?xml version="1.0" encoding="utf-8"?>
+<p:sld xmlns:a="http://schemas.openxmlformats.org/drawingml/2006/main" xmlns:r="http://schemas.openxmlformats.org/officeDocument/2006/relationships" xmlns:p="http://schemas.openxmlformats.org/presentationml/2006/main">
+  <p:cSld>
+    <p:spTree>
+      <p:nvGrpSpPr>
+        <p:cNvPr id="1" name=""/>
+        <p:cNvGrpSpPr/>
+        <p:nvPr/>
+      </p:nvGrpSpPr>
+      <p:grpSpPr>
+        <a:xfrm>
+          <a:off x="0" y="0"/>
+          <a:ext cx="0" cy="0"/>
+          <a:chOff x="0" y="0"/>
+          <a:chExt cx="0" cy="0"/>
+        </a:xfrm>
+      </p:grpSpPr>
+      <p:sp>
+        <p:nvSpPr>
+          <p:cNvPr id="4" name="Título 3"/>
+          <p:cNvSpPr>
+            <a:spLocks noGrp="1"/>
+          </p:cNvSpPr>
+          <p:nvPr>
+            <p:ph type="title"/>
+          </p:nvPr>
+        </p:nvSpPr>
+        <p:spPr>
+          <a:xfrm>
+            <a:off x="709411" y="0"/>
+            <a:ext cx="6408362" cy="1325563"/>
+          </a:xfrm>
+        </p:spPr>
+        <p:txBody>
+          <a:bodyPr/>
+          <a:lstStyle/>
+          <a:p>
+            <a:pPr algn="ctr"/>
+            <a:r>
+              <a:rPr lang="es-MX" b="1" dirty="0" smtClean="0">
+                <a:effectLst>
+                  <a:outerShdw blurRad="38100" dist="38100" dir="2700000" algn="tl">
+                    <a:srgbClr val="000000">
+                      <a:alpha val="43137"/>
+                    </a:srgbClr>
+                  </a:outerShdw>
+                </a:effectLst>
+              </a:rPr>
+              <a:t>Teoría de Detección de Señales</a:t>
+            </a:r>
+            <a:endParaRPr lang="es-MX" b="1" dirty="0">
+              <a:effectLst>
+                <a:outerShdw blurRad="38100" dist="38100" dir="2700000" algn="tl">
+                  <a:srgbClr val="000000">
+                    <a:alpha val="43137"/>
+                  </a:srgbClr>
+                </a:outerShdw>
+              </a:effectLst>
+            </a:endParaRPr>
+          </a:p>
+        </p:txBody>
+      </p:sp>
+      <p:sp>
+        <p:nvSpPr>
+          <p:cNvPr id="5" name="Marcador de contenido 4"/>
+          <p:cNvSpPr>
+            <a:spLocks noGrp="1"/>
+          </p:cNvSpPr>
+          <p:nvPr>
+            <p:ph sz="half" idx="1"/>
+          </p:nvPr>
+        </p:nvSpPr>
+        <p:spPr>
+          <a:xfrm>
+            <a:off x="1416012" y="3231572"/>
+            <a:ext cx="5575478" cy="2277738"/>
+          </a:xfrm>
+        </p:spPr>
+        <p:txBody>
+          <a:bodyPr/>
+          <a:lstStyle/>
+          <a:p>
+            <a:pPr marL="0" indent="0" algn="r">
+              <a:buNone/>
+            </a:pPr>
+            <a:r>
+              <a:rPr lang="es-MX" dirty="0" smtClean="0"/>
+              <a:t>1.- </a:t>
+            </a:r>
+            <a:r>
+              <a:rPr lang="es-MX" b="1" dirty="0" err="1" smtClean="0"/>
+              <a:t>Discriminabilidad</a:t>
+            </a:r>
+            <a:r>
+              <a:rPr lang="es-MX" b="1" dirty="0" smtClean="0">
+                <a:effectLst>
+                  <a:outerShdw blurRad="38100" dist="38100" dir="2700000" algn="tl">
+                    <a:srgbClr val="000000">
+                      <a:alpha val="43137"/>
+                    </a:srgbClr>
+                  </a:outerShdw>
+                </a:effectLst>
+              </a:rPr>
+              <a:t>  (</a:t>
+            </a:r>
+            <a:r>
+              <a:rPr lang="es-MX" b="1" dirty="0" smtClean="0"/>
+              <a:t>d’)</a:t>
+            </a:r>
+            <a:endParaRPr lang="es-MX" b="1" dirty="0">
+              <a:effectLst>
+                <a:outerShdw blurRad="38100" dist="38100" dir="2700000" algn="tl">
+                  <a:srgbClr val="000000">
+                    <a:alpha val="43137"/>
+                  </a:srgbClr>
+                </a:outerShdw>
+              </a:effectLst>
+            </a:endParaRPr>
+          </a:p>
+        </p:txBody>
+      </p:sp>
+      <p:pic>
+        <p:nvPicPr>
+          <p:cNvPr id="3" name="Imagen 2"/>
+          <p:cNvPicPr>
+            <a:picLocks noChangeAspect="1"/>
+          </p:cNvPicPr>
+          <p:nvPr/>
+        </p:nvPicPr>
+        <p:blipFill>
+          <a:blip r:embed="rId2"/>
+          <a:stretch>
+            <a:fillRect/>
+          </a:stretch>
+        </p:blipFill>
+        <p:spPr>
+          <a:xfrm>
+            <a:off x="6991490" y="483720"/>
+            <a:ext cx="3804664" cy="6292793"/>
+          </a:xfrm>
+          <a:prstGeom prst="rect">
+            <a:avLst/>
+          </a:prstGeom>
+        </p:spPr>
+      </p:pic>
+      <p:sp>
+        <p:nvSpPr>
+          <p:cNvPr id="2" name="1 Marcador de contenido"/>
+          <p:cNvSpPr>
+            <a:spLocks noGrp="1"/>
+          </p:cNvSpPr>
+          <p:nvPr>
+            <p:ph sz="half" idx="2"/>
+          </p:nvPr>
+        </p:nvSpPr>
+        <p:spPr>
+          <a:xfrm>
+            <a:off x="6296891" y="2864716"/>
+            <a:ext cx="5181600" cy="4351338"/>
+          </a:xfrm>
+        </p:spPr>
+        <p:txBody>
+          <a:bodyPr/>
+          <a:lstStyle/>
+          <a:p>
+            <a:endParaRPr lang="es-ES" dirty="0" smtClean="0"/>
+          </a:p>
+          <a:p>
+            <a:endParaRPr lang="es-MX" dirty="0"/>
+          </a:p>
+        </p:txBody>
+      </p:sp>
+    </p:spTree>
+    <p:extLst>
+      <p:ext uri="{BB962C8B-B14F-4D97-AF65-F5344CB8AC3E}">
+        <p14:creationId xmlns:p14="http://schemas.microsoft.com/office/powerpoint/2010/main" val="4026047412"/>
+      </p:ext>
+    </p:extLst>
+  </p:cSld>
+  <p:clrMapOvr>
+    <a:masterClrMapping/>
+  </p:clrMapOvr>
+  <p:timing>
+    <p:tnLst>
+      <p:par>
+        <p:cTn id="1" dur="indefinite" restart="never" nodeType="tmRoot"/>
+      </p:par>
+    </p:tnLst>
+  </p:timing>
+</p:sld>
+</file>
+
+<file path=ppt/slides/slide22.xml><?xml version="1.0" encoding="utf-8"?>
+<p:sld xmlns:a="http://schemas.openxmlformats.org/drawingml/2006/main" xmlns:r="http://schemas.openxmlformats.org/officeDocument/2006/relationships" xmlns:p="http://schemas.openxmlformats.org/presentationml/2006/main">
+  <p:cSld>
+    <p:spTree>
+      <p:nvGrpSpPr>
+        <p:cNvPr id="1" name=""/>
+        <p:cNvGrpSpPr/>
+        <p:nvPr/>
+      </p:nvGrpSpPr>
+      <p:grpSpPr>
+        <a:xfrm>
+          <a:off x="0" y="0"/>
+          <a:ext cx="0" cy="0"/>
+          <a:chOff x="0" y="0"/>
+          <a:chExt cx="0" cy="0"/>
+        </a:xfrm>
+      </p:grpSpPr>
+      <p:sp>
+        <p:nvSpPr>
+          <p:cNvPr id="4" name="Título 3"/>
+          <p:cNvSpPr>
+            <a:spLocks noGrp="1"/>
+          </p:cNvSpPr>
+          <p:nvPr>
+            <p:ph type="title"/>
+          </p:nvPr>
+        </p:nvSpPr>
+        <p:spPr>
+          <a:xfrm>
+            <a:off x="709411" y="0"/>
+            <a:ext cx="6112300" cy="1325563"/>
+          </a:xfrm>
+        </p:spPr>
+        <p:txBody>
+          <a:bodyPr/>
+          <a:lstStyle/>
+          <a:p>
+            <a:pPr algn="ctr"/>
+            <a:r>
+              <a:rPr lang="es-MX" b="1" dirty="0" smtClean="0">
+                <a:effectLst>
+                  <a:outerShdw blurRad="38100" dist="38100" dir="2700000" algn="tl">
+                    <a:srgbClr val="000000">
+                      <a:alpha val="43137"/>
+                    </a:srgbClr>
+                  </a:outerShdw>
+                </a:effectLst>
+              </a:rPr>
+              <a:t>Teoría de Detección de Señales</a:t>
+            </a:r>
+            <a:endParaRPr lang="es-MX" b="1" dirty="0">
+              <a:effectLst>
+                <a:outerShdw blurRad="38100" dist="38100" dir="2700000" algn="tl">
+                  <a:srgbClr val="000000">
+                    <a:alpha val="43137"/>
+                  </a:srgbClr>
+                </a:outerShdw>
+              </a:effectLst>
+            </a:endParaRPr>
+          </a:p>
+        </p:txBody>
+      </p:sp>
+      <p:sp>
+        <p:nvSpPr>
+          <p:cNvPr id="6" name="Marcador de contenido 5"/>
+          <p:cNvSpPr>
+            <a:spLocks noGrp="1"/>
+          </p:cNvSpPr>
+          <p:nvPr>
+            <p:ph sz="half" idx="2"/>
+          </p:nvPr>
+        </p:nvSpPr>
+        <p:spPr>
+          <a:xfrm>
+            <a:off x="-72737" y="3101073"/>
+            <a:ext cx="6019801" cy="4351338"/>
+          </a:xfrm>
+        </p:spPr>
+        <p:txBody>
+          <a:bodyPr/>
+          <a:lstStyle/>
+          <a:p>
+            <a:pPr marL="0" indent="0" algn="r">
+              <a:buNone/>
+            </a:pPr>
+            <a:r>
+              <a:rPr lang="es-MX" dirty="0" smtClean="0"/>
+              <a:t>2.- </a:t>
+            </a:r>
+            <a:r>
+              <a:rPr lang="es-MX" b="1" dirty="0" smtClean="0"/>
+              <a:t>Criterio </a:t>
+            </a:r>
+            <a:r>
+              <a:rPr lang="es-MX" b="1" dirty="0" smtClean="0">
+                <a:effectLst>
+                  <a:outerShdw blurRad="38100" dist="38100" dir="2700000" algn="tl">
+                    <a:srgbClr val="000000">
+                      <a:alpha val="43137"/>
+                    </a:srgbClr>
+                  </a:outerShdw>
+                </a:effectLst>
+              </a:rPr>
+              <a:t>(K)</a:t>
+            </a:r>
+            <a:r>
+              <a:rPr lang="es-MX" b="1" dirty="0" smtClean="0"/>
+              <a:t> y sesgo </a:t>
+            </a:r>
+            <a:r>
+              <a:rPr lang="es-MX" b="1" dirty="0" smtClean="0">
+                <a:effectLst>
+                  <a:outerShdw blurRad="38100" dist="38100" dir="2700000" algn="tl">
+                    <a:srgbClr val="000000">
+                      <a:alpha val="43137"/>
+                    </a:srgbClr>
+                  </a:outerShdw>
+                </a:effectLst>
+              </a:rPr>
+              <a:t>(Beta y C)</a:t>
+            </a:r>
+            <a:endParaRPr lang="es-MX" b="1" dirty="0"/>
+          </a:p>
+        </p:txBody>
+      </p:sp>
+      <p:pic>
+        <p:nvPicPr>
+          <p:cNvPr id="7" name="Imagen 6"/>
+          <p:cNvPicPr>
+            <a:picLocks noChangeAspect="1"/>
+          </p:cNvPicPr>
+          <p:nvPr/>
+        </p:nvPicPr>
+        <p:blipFill>
+          <a:blip r:embed="rId2"/>
+          <a:stretch>
+            <a:fillRect/>
+          </a:stretch>
+        </p:blipFill>
+        <p:spPr>
+          <a:xfrm>
+            <a:off x="6354120" y="143756"/>
+            <a:ext cx="5585035" cy="6619735"/>
+          </a:xfrm>
+          <a:prstGeom prst="rect">
+            <a:avLst/>
+          </a:prstGeom>
+        </p:spPr>
+      </p:pic>
+      <p:sp>
+        <p:nvSpPr>
+          <p:cNvPr id="2" name="1 Marcador de contenido"/>
+          <p:cNvSpPr>
+            <a:spLocks noGrp="1"/>
+          </p:cNvSpPr>
+          <p:nvPr>
+            <p:ph sz="half" idx="1"/>
+          </p:nvPr>
+        </p:nvSpPr>
+        <p:spPr/>
+        <p:txBody>
+          <a:bodyPr/>
+          <a:lstStyle/>
+          <a:p>
+            <a:endParaRPr lang="es-ES" dirty="0" smtClean="0"/>
+          </a:p>
+          <a:p>
+            <a:endParaRPr lang="es-MX" dirty="0"/>
+          </a:p>
+        </p:txBody>
+      </p:sp>
+    </p:spTree>
+    <p:extLst>
+      <p:ext uri="{BB962C8B-B14F-4D97-AF65-F5344CB8AC3E}">
+        <p14:creationId xmlns:p14="http://schemas.microsoft.com/office/powerpoint/2010/main" val="2707569393"/>
       </p:ext>
     </p:extLst>
   </p:cSld>
@@ -3621,7 +5643,7 @@
       </p:grpSpPr>
       <p:sp>
         <p:nvSpPr>
-          <p:cNvPr id="2" name="Título 1"/>
+          <p:cNvPr id="2" name="1 Título"/>
           <p:cNvSpPr>
             <a:spLocks noGrp="1"/>
           </p:cNvSpPr>
@@ -3631,12 +5653,14 @@
         </p:nvSpPr>
         <p:spPr/>
         <p:txBody>
-          <a:bodyPr/>
+          <a:bodyPr>
+            <a:normAutofit/>
+          </a:bodyPr>
           <a:lstStyle/>
           <a:p>
             <a:r>
               <a:rPr lang="es-MX" b="1" dirty="0" smtClean="0"/>
-              <a:t>El mundo está cargado de ruido e incertidumbre….</a:t>
+              <a:t>Un problema de decisión</a:t>
             </a:r>
             <a:endParaRPr lang="es-MX" b="1" dirty="0"/>
           </a:p>
@@ -3644,7 +5668,7 @@
       </p:sp>
       <p:sp>
         <p:nvSpPr>
-          <p:cNvPr id="3" name="Marcador de contenido 2"/>
+          <p:cNvPr id="3" name="2 Marcador de contenido"/>
           <p:cNvSpPr>
             <a:spLocks noGrp="1"/>
           </p:cNvSpPr>
@@ -3654,74 +5678,67 @@
         </p:nvSpPr>
         <p:spPr/>
         <p:txBody>
-          <a:bodyPr/>
-          <a:lstStyle/>
+          <a:bodyPr>
+            <a:normAutofit lnSpcReduction="10000"/>
+          </a:bodyPr>
+          <a:lstStyle/>
+          <a:p>
+            <a:r>
+              <a:rPr lang="es-MX" dirty="0" smtClean="0"/>
+              <a:t>¿Esa persona de cabello largo es una mujer?</a:t>
+            </a:r>
+          </a:p>
           <a:p>
             <a:endParaRPr lang="es-MX" dirty="0" smtClean="0"/>
           </a:p>
           <a:p>
+            <a:r>
+              <a:rPr lang="es-MX" dirty="0" smtClean="0"/>
+              <a:t>¿Mi novio está enojado?</a:t>
+            </a:r>
+          </a:p>
+          <a:p>
+            <a:endParaRPr lang="es-MX" dirty="0" smtClean="0"/>
+          </a:p>
+          <a:p>
+            <a:r>
+              <a:rPr lang="es-MX" dirty="0" smtClean="0"/>
+              <a:t>¿Este paciente tiene un tumor?</a:t>
+            </a:r>
+          </a:p>
+          <a:p>
+            <a:endParaRPr lang="es-MX" dirty="0" smtClean="0"/>
+          </a:p>
+          <a:p>
+            <a:r>
+              <a:rPr lang="es-MX" dirty="0" smtClean="0"/>
+              <a:t>¿Este paciente tiene depresión?</a:t>
+            </a:r>
+          </a:p>
+          <a:p>
+            <a:endParaRPr lang="es-MX" dirty="0" smtClean="0"/>
+          </a:p>
+          <a:p>
+            <a:r>
+              <a:rPr lang="es-MX" dirty="0" smtClean="0"/>
+              <a:t>¿Esa bolsa contiene una bomba?</a:t>
+            </a:r>
+          </a:p>
+          <a:p>
             <a:endParaRPr lang="es-MX" dirty="0"/>
           </a:p>
         </p:txBody>
       </p:sp>
-      <p:pic>
-        <p:nvPicPr>
-          <p:cNvPr id="1026" name="Picture 2" descr="Resultado de imagen para conejo blanco y negro dibujo"/>
-          <p:cNvPicPr>
-            <a:picLocks noChangeAspect="1" noChangeArrowheads="1"/>
-          </p:cNvPicPr>
-          <p:nvPr/>
-        </p:nvPicPr>
-        <p:blipFill>
-          <a:blip r:embed="rId2">
-            <a:extLst>
-              <a:ext uri="{28A0092B-C50C-407E-A947-70E740481C1C}">
-                <a14:useLocalDpi xmlns:a14="http://schemas.microsoft.com/office/drawing/2010/main" val="0"/>
-              </a:ext>
-            </a:extLst>
-          </a:blip>
-          <a:srcRect/>
-          <a:stretch>
-            <a:fillRect/>
-          </a:stretch>
-        </p:blipFill>
-        <p:spPr bwMode="auto">
-          <a:xfrm>
-            <a:off x="838200" y="2743200"/>
-            <a:ext cx="2820651" cy="2118864"/>
-          </a:xfrm>
-          <a:prstGeom prst="rect">
-            <a:avLst/>
-          </a:prstGeom>
-          <a:noFill/>
-          <a:extLst>
-            <a:ext uri="{909E8E84-426E-40DD-AFC4-6F175D3DCCD1}">
-              <a14:hiddenFill xmlns:a14="http://schemas.microsoft.com/office/drawing/2010/main">
-                <a:solidFill>
-                  <a:srgbClr val="FFFFFF"/>
-                </a:solidFill>
-              </a14:hiddenFill>
-            </a:ext>
-          </a:extLst>
-        </p:spPr>
-      </p:pic>
     </p:spTree>
     <p:extLst>
       <p:ext uri="{BB962C8B-B14F-4D97-AF65-F5344CB8AC3E}">
-        <p14:creationId xmlns:p14="http://schemas.microsoft.com/office/powerpoint/2010/main" val="3258842385"/>
+        <p14:creationId xmlns:p14="http://schemas.microsoft.com/office/powerpoint/2010/main" val="3199141321"/>
       </p:ext>
     </p:extLst>
   </p:cSld>
   <p:clrMapOvr>
     <a:masterClrMapping/>
   </p:clrMapOvr>
-  <p:timing>
-    <p:tnLst>
-      <p:par>
-        <p:cTn id="1" dur="indefinite" restart="never" nodeType="tmRoot"/>
-      </p:par>
-    </p:tnLst>
-  </p:timing>
 </p:sld>
 </file>
 
@@ -3744,7 +5761,7 @@
       </p:grpSpPr>
       <p:sp>
         <p:nvSpPr>
-          <p:cNvPr id="2" name="Título 1"/>
+          <p:cNvPr id="2" name="1 Título"/>
           <p:cNvSpPr>
             <a:spLocks noGrp="1"/>
           </p:cNvSpPr>
@@ -3758,104 +5775,62 @@
           <a:lstStyle/>
           <a:p>
             <a:r>
+              <a:rPr lang="es-MX" dirty="0" smtClean="0"/>
+              <a:t>Problema 1: La incertidumbre</a:t>
+            </a:r>
+            <a:endParaRPr lang="es-MX" dirty="0"/>
+          </a:p>
+        </p:txBody>
+      </p:sp>
+      <p:sp>
+        <p:nvSpPr>
+          <p:cNvPr id="3" name="2 Marcador de contenido"/>
+          <p:cNvSpPr>
+            <a:spLocks noGrp="1"/>
+          </p:cNvSpPr>
+          <p:nvPr>
+            <p:ph idx="1"/>
+          </p:nvPr>
+        </p:nvSpPr>
+        <p:spPr/>
+        <p:txBody>
+          <a:bodyPr>
+            <a:normAutofit/>
+          </a:bodyPr>
+          <a:lstStyle/>
+          <a:p>
+            <a:pPr marL="0" indent="0">
+              <a:buNone/>
+            </a:pPr>
+            <a:r>
               <a:rPr lang="es-MX" b="1" dirty="0" smtClean="0"/>
-              <a:t>El mundo está cargado de ruido e incertidumbre….</a:t>
-            </a:r>
-            <a:endParaRPr lang="es-MX" b="1" dirty="0"/>
-          </a:p>
-        </p:txBody>
-      </p:sp>
-      <p:sp>
-        <p:nvSpPr>
-          <p:cNvPr id="3" name="Marcador de contenido 2"/>
-          <p:cNvSpPr>
-            <a:spLocks noGrp="1"/>
-          </p:cNvSpPr>
-          <p:nvPr>
-            <p:ph idx="1"/>
-          </p:nvPr>
-        </p:nvSpPr>
-        <p:spPr/>
-        <p:txBody>
-          <a:bodyPr/>
-          <a:lstStyle/>
-          <a:p>
-            <a:endParaRPr lang="es-MX" dirty="0" smtClean="0"/>
+              <a:t>La información es imprecisa:</a:t>
+            </a:r>
           </a:p>
           <a:p>
             <a:endParaRPr lang="es-MX" dirty="0"/>
           </a:p>
-        </p:txBody>
-      </p:sp>
-      <p:pic>
-        <p:nvPicPr>
-          <p:cNvPr id="1026" name="Picture 2" descr="Resultado de imagen para conejo blanco y negro dibujo"/>
-          <p:cNvPicPr>
-            <a:picLocks noChangeAspect="1" noChangeArrowheads="1"/>
-          </p:cNvPicPr>
-          <p:nvPr/>
-        </p:nvPicPr>
-        <p:blipFill>
-          <a:blip r:embed="rId2">
-            <a:extLst>
-              <a:ext uri="{28A0092B-C50C-407E-A947-70E740481C1C}">
-                <a14:useLocalDpi xmlns:a14="http://schemas.microsoft.com/office/drawing/2010/main" val="0"/>
-              </a:ext>
-            </a:extLst>
-          </a:blip>
-          <a:srcRect/>
-          <a:stretch>
-            <a:fillRect/>
-          </a:stretch>
-        </p:blipFill>
-        <p:spPr bwMode="auto">
-          <a:xfrm>
-            <a:off x="838200" y="2743200"/>
-            <a:ext cx="2820651" cy="2118864"/>
-          </a:xfrm>
-          <a:prstGeom prst="rect">
-            <a:avLst/>
-          </a:prstGeom>
-          <a:noFill/>
-          <a:extLst>
-            <a:ext uri="{909E8E84-426E-40DD-AFC4-6F175D3DCCD1}">
-              <a14:hiddenFill xmlns:a14="http://schemas.microsoft.com/office/drawing/2010/main">
-                <a:solidFill>
-                  <a:srgbClr val="FFFFFF"/>
-                </a:solidFill>
-              </a14:hiddenFill>
-            </a:ext>
-          </a:extLst>
-        </p:spPr>
-      </p:pic>
-      <p:pic>
-        <p:nvPicPr>
-          <p:cNvPr id="4" name="Imagen 3"/>
-          <p:cNvPicPr>
-            <a:picLocks noChangeAspect="1"/>
-          </p:cNvPicPr>
-          <p:nvPr/>
-        </p:nvPicPr>
-        <p:blipFill>
-          <a:blip r:embed="rId3"/>
-          <a:stretch>
-            <a:fillRect/>
-          </a:stretch>
-        </p:blipFill>
-        <p:spPr>
-          <a:xfrm>
-            <a:off x="4787856" y="1476375"/>
-            <a:ext cx="6334125" cy="5381625"/>
-          </a:xfrm>
-          <a:prstGeom prst="rect">
-            <a:avLst/>
-          </a:prstGeom>
-        </p:spPr>
-      </p:pic>
+          <a:p>
+            <a:r>
+              <a:rPr lang="es-MX" dirty="0" smtClean="0"/>
+              <a:t>Nada aparece en el mundo ‘exactamente de la misma forma’ en cada ocurrencia.</a:t>
+            </a:r>
+          </a:p>
+          <a:p>
+            <a:endParaRPr lang="es-MX" dirty="0"/>
+          </a:p>
+          <a:p>
+            <a:r>
+              <a:rPr lang="es-MX" dirty="0" smtClean="0"/>
+              <a:t>Nada se percibe ‘exactamente de la misma forma’ cada vez que nos lo encontramos.</a:t>
+            </a:r>
+          </a:p>
+        </p:txBody>
+      </p:sp>
     </p:spTree>
     <p:extLst>
       <p:ext uri="{BB962C8B-B14F-4D97-AF65-F5344CB8AC3E}">
-        <p14:creationId xmlns:p14="http://schemas.microsoft.com/office/powerpoint/2010/main" val="3397591169"/>
+        <p14:creationId xmlns:p14="http://schemas.microsoft.com/office/powerpoint/2010/main" val="2989594566"/>
       </p:ext>
     </p:extLst>
   </p:cSld>
@@ -3891,6 +5866,126 @@
       </p:grpSpPr>
       <p:sp>
         <p:nvSpPr>
+          <p:cNvPr id="2" name="1 Título"/>
+          <p:cNvSpPr>
+            <a:spLocks noGrp="1"/>
+          </p:cNvSpPr>
+          <p:nvPr>
+            <p:ph type="title"/>
+          </p:nvPr>
+        </p:nvSpPr>
+        <p:spPr>
+          <a:xfrm>
+            <a:off x="623392" y="9925"/>
+            <a:ext cx="10972800" cy="1143000"/>
+          </a:xfrm>
+        </p:spPr>
+        <p:txBody>
+          <a:bodyPr/>
+          <a:lstStyle/>
+          <a:p>
+            <a:r>
+              <a:rPr lang="es-MX" dirty="0" smtClean="0"/>
+              <a:t>Problema 2: Las consecuencias.</a:t>
+            </a:r>
+            <a:endParaRPr lang="es-MX" dirty="0"/>
+          </a:p>
+        </p:txBody>
+      </p:sp>
+      <p:sp>
+        <p:nvSpPr>
+          <p:cNvPr id="3" name="2 Marcador de contenido"/>
+          <p:cNvSpPr>
+            <a:spLocks noGrp="1"/>
+          </p:cNvSpPr>
+          <p:nvPr>
+            <p:ph sz="half" idx="1"/>
+          </p:nvPr>
+        </p:nvSpPr>
+        <p:spPr>
+          <a:xfrm>
+            <a:off x="623392" y="1124745"/>
+            <a:ext cx="11247040" cy="4525963"/>
+          </a:xfrm>
+        </p:spPr>
+        <p:txBody>
+          <a:bodyPr/>
+          <a:lstStyle/>
+          <a:p>
+            <a:pPr marL="0" indent="0">
+              <a:buNone/>
+            </a:pPr>
+            <a:endParaRPr lang="es-MX" b="1" dirty="0" smtClean="0"/>
+          </a:p>
+          <a:p>
+            <a:pPr marL="0" indent="0">
+              <a:buNone/>
+            </a:pPr>
+            <a:endParaRPr lang="es-MX" b="1" dirty="0"/>
+          </a:p>
+          <a:p>
+            <a:pPr marL="0" indent="0">
+              <a:buNone/>
+            </a:pPr>
+            <a:r>
+              <a:rPr lang="es-MX" b="1" dirty="0" smtClean="0"/>
+              <a:t>Los errores cuestan y los aciertos pagan.</a:t>
+            </a:r>
+          </a:p>
+          <a:p>
+            <a:endParaRPr lang="es-MX" dirty="0"/>
+          </a:p>
+          <a:p>
+            <a:pPr marL="0" indent="0" algn="r">
+              <a:buNone/>
+            </a:pPr>
+            <a:r>
+              <a:rPr lang="es-MX" dirty="0" smtClean="0"/>
+              <a:t>… y lo hacen diferencialmente.</a:t>
+            </a:r>
+            <a:endParaRPr lang="es-MX" dirty="0"/>
+          </a:p>
+        </p:txBody>
+      </p:sp>
+    </p:spTree>
+    <p:extLst>
+      <p:ext uri="{BB962C8B-B14F-4D97-AF65-F5344CB8AC3E}">
+        <p14:creationId xmlns:p14="http://schemas.microsoft.com/office/powerpoint/2010/main" val="3782515652"/>
+      </p:ext>
+    </p:extLst>
+  </p:cSld>
+  <p:clrMapOvr>
+    <a:masterClrMapping/>
+  </p:clrMapOvr>
+  <p:timing>
+    <p:tnLst>
+      <p:par>
+        <p:cTn id="1" dur="indefinite" restart="never" nodeType="tmRoot"/>
+      </p:par>
+    </p:tnLst>
+  </p:timing>
+</p:sld>
+</file>
+
+<file path=ppt/slides/slide6.xml><?xml version="1.0" encoding="utf-8"?>
+<p:sld xmlns:a="http://schemas.openxmlformats.org/drawingml/2006/main" xmlns:r="http://schemas.openxmlformats.org/officeDocument/2006/relationships" xmlns:p="http://schemas.openxmlformats.org/presentationml/2006/main">
+  <p:cSld>
+    <p:spTree>
+      <p:nvGrpSpPr>
+        <p:cNvPr id="1" name=""/>
+        <p:cNvGrpSpPr/>
+        <p:nvPr/>
+      </p:nvGrpSpPr>
+      <p:grpSpPr>
+        <a:xfrm>
+          <a:off x="0" y="0"/>
+          <a:ext cx="0" cy="0"/>
+          <a:chOff x="0" y="0"/>
+          <a:chExt cx="0" cy="0"/>
+        </a:xfrm>
+      </p:grpSpPr>
+      <p:sp>
+        <p:nvSpPr>
           <p:cNvPr id="2" name="Título 1"/>
           <p:cNvSpPr>
             <a:spLocks noGrp="1"/>
@@ -3975,6 +6070,276 @@
           </a:extLst>
         </p:spPr>
       </p:pic>
+    </p:spTree>
+    <p:extLst>
+      <p:ext uri="{BB962C8B-B14F-4D97-AF65-F5344CB8AC3E}">
+        <p14:creationId xmlns:p14="http://schemas.microsoft.com/office/powerpoint/2010/main" val="3258842385"/>
+      </p:ext>
+    </p:extLst>
+  </p:cSld>
+  <p:clrMapOvr>
+    <a:masterClrMapping/>
+  </p:clrMapOvr>
+  <p:timing>
+    <p:tnLst>
+      <p:par>
+        <p:cTn id="1" dur="indefinite" restart="never" nodeType="tmRoot"/>
+      </p:par>
+    </p:tnLst>
+  </p:timing>
+</p:sld>
+</file>
+
+<file path=ppt/slides/slide7.xml><?xml version="1.0" encoding="utf-8"?>
+<p:sld xmlns:a="http://schemas.openxmlformats.org/drawingml/2006/main" xmlns:r="http://schemas.openxmlformats.org/officeDocument/2006/relationships" xmlns:p="http://schemas.openxmlformats.org/presentationml/2006/main">
+  <p:cSld>
+    <p:spTree>
+      <p:nvGrpSpPr>
+        <p:cNvPr id="1" name=""/>
+        <p:cNvGrpSpPr/>
+        <p:nvPr/>
+      </p:nvGrpSpPr>
+      <p:grpSpPr>
+        <a:xfrm>
+          <a:off x="0" y="0"/>
+          <a:ext cx="0" cy="0"/>
+          <a:chOff x="0" y="0"/>
+          <a:chExt cx="0" cy="0"/>
+        </a:xfrm>
+      </p:grpSpPr>
+      <p:sp>
+        <p:nvSpPr>
+          <p:cNvPr id="2" name="Título 1"/>
+          <p:cNvSpPr>
+            <a:spLocks noGrp="1"/>
+          </p:cNvSpPr>
+          <p:nvPr>
+            <p:ph type="title"/>
+          </p:nvPr>
+        </p:nvSpPr>
+        <p:spPr/>
+        <p:txBody>
+          <a:bodyPr/>
+          <a:lstStyle/>
+          <a:p>
+            <a:r>
+              <a:rPr lang="es-MX" b="1" dirty="0" smtClean="0"/>
+              <a:t>El mundo está cargado de ruido e incertidumbre….</a:t>
+            </a:r>
+            <a:endParaRPr lang="es-MX" b="1" dirty="0"/>
+          </a:p>
+        </p:txBody>
+      </p:sp>
+      <p:sp>
+        <p:nvSpPr>
+          <p:cNvPr id="3" name="Marcador de contenido 2"/>
+          <p:cNvSpPr>
+            <a:spLocks noGrp="1"/>
+          </p:cNvSpPr>
+          <p:nvPr>
+            <p:ph idx="1"/>
+          </p:nvPr>
+        </p:nvSpPr>
+        <p:spPr/>
+        <p:txBody>
+          <a:bodyPr/>
+          <a:lstStyle/>
+          <a:p>
+            <a:endParaRPr lang="es-MX" dirty="0" smtClean="0"/>
+          </a:p>
+          <a:p>
+            <a:endParaRPr lang="es-MX" dirty="0"/>
+          </a:p>
+        </p:txBody>
+      </p:sp>
+      <p:pic>
+        <p:nvPicPr>
+          <p:cNvPr id="1026" name="Picture 2" descr="Resultado de imagen para conejo blanco y negro dibujo"/>
+          <p:cNvPicPr>
+            <a:picLocks noChangeAspect="1" noChangeArrowheads="1"/>
+          </p:cNvPicPr>
+          <p:nvPr/>
+        </p:nvPicPr>
+        <p:blipFill>
+          <a:blip r:embed="rId2">
+            <a:extLst>
+              <a:ext uri="{28A0092B-C50C-407E-A947-70E740481C1C}">
+                <a14:useLocalDpi xmlns:a14="http://schemas.microsoft.com/office/drawing/2010/main" val="0"/>
+              </a:ext>
+            </a:extLst>
+          </a:blip>
+          <a:srcRect/>
+          <a:stretch>
+            <a:fillRect/>
+          </a:stretch>
+        </p:blipFill>
+        <p:spPr bwMode="auto">
+          <a:xfrm>
+            <a:off x="838200" y="2743200"/>
+            <a:ext cx="2820651" cy="2118864"/>
+          </a:xfrm>
+          <a:prstGeom prst="rect">
+            <a:avLst/>
+          </a:prstGeom>
+          <a:noFill/>
+          <a:extLst>
+            <a:ext uri="{909E8E84-426E-40DD-AFC4-6F175D3DCCD1}">
+              <a14:hiddenFill xmlns:a14="http://schemas.microsoft.com/office/drawing/2010/main">
+                <a:solidFill>
+                  <a:srgbClr val="FFFFFF"/>
+                </a:solidFill>
+              </a14:hiddenFill>
+            </a:ext>
+          </a:extLst>
+        </p:spPr>
+      </p:pic>
+      <p:pic>
+        <p:nvPicPr>
+          <p:cNvPr id="4" name="Imagen 3"/>
+          <p:cNvPicPr>
+            <a:picLocks noChangeAspect="1"/>
+          </p:cNvPicPr>
+          <p:nvPr/>
+        </p:nvPicPr>
+        <p:blipFill>
+          <a:blip r:embed="rId3"/>
+          <a:stretch>
+            <a:fillRect/>
+          </a:stretch>
+        </p:blipFill>
+        <p:spPr>
+          <a:xfrm>
+            <a:off x="4787856" y="1476375"/>
+            <a:ext cx="6334125" cy="5381625"/>
+          </a:xfrm>
+          <a:prstGeom prst="rect">
+            <a:avLst/>
+          </a:prstGeom>
+        </p:spPr>
+      </p:pic>
+    </p:spTree>
+    <p:extLst>
+      <p:ext uri="{BB962C8B-B14F-4D97-AF65-F5344CB8AC3E}">
+        <p14:creationId xmlns:p14="http://schemas.microsoft.com/office/powerpoint/2010/main" val="3397591169"/>
+      </p:ext>
+    </p:extLst>
+  </p:cSld>
+  <p:clrMapOvr>
+    <a:masterClrMapping/>
+  </p:clrMapOvr>
+  <p:timing>
+    <p:tnLst>
+      <p:par>
+        <p:cTn id="1" dur="indefinite" restart="never" nodeType="tmRoot"/>
+      </p:par>
+    </p:tnLst>
+  </p:timing>
+</p:sld>
+</file>
+
+<file path=ppt/slides/slide8.xml><?xml version="1.0" encoding="utf-8"?>
+<p:sld xmlns:a="http://schemas.openxmlformats.org/drawingml/2006/main" xmlns:r="http://schemas.openxmlformats.org/officeDocument/2006/relationships" xmlns:p="http://schemas.openxmlformats.org/presentationml/2006/main">
+  <p:cSld>
+    <p:spTree>
+      <p:nvGrpSpPr>
+        <p:cNvPr id="1" name=""/>
+        <p:cNvGrpSpPr/>
+        <p:nvPr/>
+      </p:nvGrpSpPr>
+      <p:grpSpPr>
+        <a:xfrm>
+          <a:off x="0" y="0"/>
+          <a:ext cx="0" cy="0"/>
+          <a:chOff x="0" y="0"/>
+          <a:chExt cx="0" cy="0"/>
+        </a:xfrm>
+      </p:grpSpPr>
+      <p:sp>
+        <p:nvSpPr>
+          <p:cNvPr id="2" name="Título 1"/>
+          <p:cNvSpPr>
+            <a:spLocks noGrp="1"/>
+          </p:cNvSpPr>
+          <p:nvPr>
+            <p:ph type="title"/>
+          </p:nvPr>
+        </p:nvSpPr>
+        <p:spPr/>
+        <p:txBody>
+          <a:bodyPr/>
+          <a:lstStyle/>
+          <a:p>
+            <a:r>
+              <a:rPr lang="es-MX" b="1" dirty="0" smtClean="0"/>
+              <a:t>El mundo está cargado de ruido e incertidumbre….</a:t>
+            </a:r>
+            <a:endParaRPr lang="es-MX" b="1" dirty="0"/>
+          </a:p>
+        </p:txBody>
+      </p:sp>
+      <p:sp>
+        <p:nvSpPr>
+          <p:cNvPr id="3" name="Marcador de contenido 2"/>
+          <p:cNvSpPr>
+            <a:spLocks noGrp="1"/>
+          </p:cNvSpPr>
+          <p:nvPr>
+            <p:ph idx="1"/>
+          </p:nvPr>
+        </p:nvSpPr>
+        <p:spPr/>
+        <p:txBody>
+          <a:bodyPr/>
+          <a:lstStyle/>
+          <a:p>
+            <a:endParaRPr lang="es-MX" dirty="0" smtClean="0"/>
+          </a:p>
+          <a:p>
+            <a:endParaRPr lang="es-MX" dirty="0"/>
+          </a:p>
+        </p:txBody>
+      </p:sp>
+      <p:pic>
+        <p:nvPicPr>
+          <p:cNvPr id="1026" name="Picture 2" descr="Resultado de imagen para conejo blanco y negro dibujo"/>
+          <p:cNvPicPr>
+            <a:picLocks noChangeAspect="1" noChangeArrowheads="1"/>
+          </p:cNvPicPr>
+          <p:nvPr/>
+        </p:nvPicPr>
+        <p:blipFill>
+          <a:blip r:embed="rId2">
+            <a:extLst>
+              <a:ext uri="{28A0092B-C50C-407E-A947-70E740481C1C}">
+                <a14:useLocalDpi xmlns:a14="http://schemas.microsoft.com/office/drawing/2010/main" val="0"/>
+              </a:ext>
+            </a:extLst>
+          </a:blip>
+          <a:srcRect/>
+          <a:stretch>
+            <a:fillRect/>
+          </a:stretch>
+        </p:blipFill>
+        <p:spPr bwMode="auto">
+          <a:xfrm>
+            <a:off x="838200" y="2743200"/>
+            <a:ext cx="2820651" cy="2118864"/>
+          </a:xfrm>
+          <a:prstGeom prst="rect">
+            <a:avLst/>
+          </a:prstGeom>
+          <a:noFill/>
+          <a:extLst>
+            <a:ext uri="{909E8E84-426E-40DD-AFC4-6F175D3DCCD1}">
+              <a14:hiddenFill xmlns:a14="http://schemas.microsoft.com/office/drawing/2010/main">
+                <a:solidFill>
+                  <a:srgbClr val="FFFFFF"/>
+                </a:solidFill>
+              </a14:hiddenFill>
+            </a:ext>
+          </a:extLst>
+        </p:spPr>
+      </p:pic>
       <p:pic>
         <p:nvPicPr>
           <p:cNvPr id="4" name="Imagen 3"/>
@@ -4019,7 +6384,7 @@
 </p:sld>
 </file>
 
-<file path=ppt/slides/slide6.xml><?xml version="1.0" encoding="utf-8"?>
+<file path=ppt/slides/slide9.xml><?xml version="1.0" encoding="utf-8"?>
 <p:sld xmlns:a="http://schemas.openxmlformats.org/drawingml/2006/main" xmlns:r="http://schemas.openxmlformats.org/officeDocument/2006/relationships" xmlns:p="http://schemas.openxmlformats.org/presentationml/2006/main">
   <p:cSld>
     <p:spTree>
@@ -4187,466 +6552,6 @@
     <p:extLst>
       <p:ext uri="{BB962C8B-B14F-4D97-AF65-F5344CB8AC3E}">
         <p14:creationId xmlns:p14="http://schemas.microsoft.com/office/powerpoint/2010/main" val="3140314620"/>
-      </p:ext>
-    </p:extLst>
-  </p:cSld>
-  <p:clrMapOvr>
-    <a:masterClrMapping/>
-  </p:clrMapOvr>
-  <p:timing>
-    <p:tnLst>
-      <p:par>
-        <p:cTn id="1" dur="indefinite" restart="never" nodeType="tmRoot"/>
-      </p:par>
-    </p:tnLst>
-  </p:timing>
-</p:sld>
-</file>
-
-<file path=ppt/slides/slide7.xml><?xml version="1.0" encoding="utf-8"?>
-<p:sld xmlns:a="http://schemas.openxmlformats.org/drawingml/2006/main" xmlns:r="http://schemas.openxmlformats.org/officeDocument/2006/relationships" xmlns:p="http://schemas.openxmlformats.org/presentationml/2006/main">
-  <p:cSld>
-    <p:spTree>
-      <p:nvGrpSpPr>
-        <p:cNvPr id="1" name=""/>
-        <p:cNvGrpSpPr/>
-        <p:nvPr/>
-      </p:nvGrpSpPr>
-      <p:grpSpPr>
-        <a:xfrm>
-          <a:off x="0" y="0"/>
-          <a:ext cx="0" cy="0"/>
-          <a:chOff x="0" y="0"/>
-          <a:chExt cx="0" cy="0"/>
-        </a:xfrm>
-      </p:grpSpPr>
-      <p:pic>
-        <p:nvPicPr>
-          <p:cNvPr id="4" name="Imagen 3"/>
-          <p:cNvPicPr>
-            <a:picLocks noChangeAspect="1"/>
-          </p:cNvPicPr>
-          <p:nvPr/>
-        </p:nvPicPr>
-        <p:blipFill>
-          <a:blip r:embed="rId2"/>
-          <a:stretch>
-            <a:fillRect/>
-          </a:stretch>
-        </p:blipFill>
-        <p:spPr>
-          <a:xfrm>
-            <a:off x="3796249" y="1284047"/>
-            <a:ext cx="8271255" cy="5239023"/>
-          </a:xfrm>
-          <a:prstGeom prst="rect">
-            <a:avLst/>
-          </a:prstGeom>
-        </p:spPr>
-      </p:pic>
-      <p:sp>
-        <p:nvSpPr>
-          <p:cNvPr id="2" name="Título 1"/>
-          <p:cNvSpPr>
-            <a:spLocks noGrp="1"/>
-          </p:cNvSpPr>
-          <p:nvPr>
-            <p:ph type="title"/>
-          </p:nvPr>
-        </p:nvSpPr>
-        <p:spPr>
-          <a:xfrm>
-            <a:off x="387439" y="296068"/>
-            <a:ext cx="10515600" cy="1325563"/>
-          </a:xfrm>
-        </p:spPr>
-        <p:txBody>
-          <a:bodyPr/>
-          <a:lstStyle/>
-          <a:p>
-            <a:r>
-              <a:rPr lang="es-MX" dirty="0" smtClean="0"/>
-              <a:t>Los aciertos pagan y los errores cuestan….</a:t>
-            </a:r>
-            <a:br>
-              <a:rPr lang="es-MX" dirty="0" smtClean="0"/>
-            </a:br>
-            <a:endParaRPr lang="es-MX" sz="2500" i="1" dirty="0"/>
-          </a:p>
-        </p:txBody>
-      </p:sp>
-      <p:sp>
-        <p:nvSpPr>
-          <p:cNvPr id="3" name="Marcador de contenido 2"/>
-          <p:cNvSpPr>
-            <a:spLocks noGrp="1"/>
-          </p:cNvSpPr>
-          <p:nvPr>
-            <p:ph idx="1"/>
-          </p:nvPr>
-        </p:nvSpPr>
-        <p:spPr/>
-        <p:txBody>
-          <a:bodyPr/>
-          <a:lstStyle/>
-          <a:p>
-            <a:endParaRPr lang="es-MX" dirty="0" smtClean="0"/>
-          </a:p>
-          <a:p>
-            <a:endParaRPr lang="es-MX" dirty="0"/>
-          </a:p>
-        </p:txBody>
-      </p:sp>
-      <p:pic>
-        <p:nvPicPr>
-          <p:cNvPr id="1026" name="Picture 2" descr="Resultado de imagen para conejo blanco y negro dibujo"/>
-          <p:cNvPicPr>
-            <a:picLocks noChangeAspect="1" noChangeArrowheads="1"/>
-          </p:cNvPicPr>
-          <p:nvPr/>
-        </p:nvPicPr>
-        <p:blipFill>
-          <a:blip r:embed="rId3">
-            <a:extLst>
-              <a:ext uri="{28A0092B-C50C-407E-A947-70E740481C1C}">
-                <a14:useLocalDpi xmlns:a14="http://schemas.microsoft.com/office/drawing/2010/main" val="0"/>
-              </a:ext>
-            </a:extLst>
-          </a:blip>
-          <a:srcRect/>
-          <a:stretch>
-            <a:fillRect/>
-          </a:stretch>
-        </p:blipFill>
-        <p:spPr bwMode="auto">
-          <a:xfrm>
-            <a:off x="838200" y="2743200"/>
-            <a:ext cx="2820651" cy="2118864"/>
-          </a:xfrm>
-          <a:prstGeom prst="rect">
-            <a:avLst/>
-          </a:prstGeom>
-          <a:noFill/>
-          <a:extLst>
-            <a:ext uri="{909E8E84-426E-40DD-AFC4-6F175D3DCCD1}">
-              <a14:hiddenFill xmlns:a14="http://schemas.microsoft.com/office/drawing/2010/main">
-                <a:solidFill>
-                  <a:srgbClr val="FFFFFF"/>
-                </a:solidFill>
-              </a14:hiddenFill>
-            </a:ext>
-          </a:extLst>
-        </p:spPr>
-      </p:pic>
-    </p:spTree>
-    <p:extLst>
-      <p:ext uri="{BB962C8B-B14F-4D97-AF65-F5344CB8AC3E}">
-        <p14:creationId xmlns:p14="http://schemas.microsoft.com/office/powerpoint/2010/main" val="692435972"/>
-      </p:ext>
-    </p:extLst>
-  </p:cSld>
-  <p:clrMapOvr>
-    <a:masterClrMapping/>
-  </p:clrMapOvr>
-  <p:timing>
-    <p:tnLst>
-      <p:par>
-        <p:cTn id="1" dur="indefinite" restart="never" nodeType="tmRoot"/>
-      </p:par>
-    </p:tnLst>
-  </p:timing>
-</p:sld>
-</file>
-
-<file path=ppt/slides/slide8.xml><?xml version="1.0" encoding="utf-8"?>
-<p:sld xmlns:a="http://schemas.openxmlformats.org/drawingml/2006/main" xmlns:r="http://schemas.openxmlformats.org/officeDocument/2006/relationships" xmlns:p="http://schemas.openxmlformats.org/presentationml/2006/main">
-  <p:cSld>
-    <p:spTree>
-      <p:nvGrpSpPr>
-        <p:cNvPr id="1" name=""/>
-        <p:cNvGrpSpPr/>
-        <p:nvPr/>
-      </p:nvGrpSpPr>
-      <p:grpSpPr>
-        <a:xfrm>
-          <a:off x="0" y="0"/>
-          <a:ext cx="0" cy="0"/>
-          <a:chOff x="0" y="0"/>
-          <a:chExt cx="0" cy="0"/>
-        </a:xfrm>
-      </p:grpSpPr>
-      <p:sp>
-        <p:nvSpPr>
-          <p:cNvPr id="2" name="Título 1"/>
-          <p:cNvSpPr>
-            <a:spLocks noGrp="1"/>
-          </p:cNvSpPr>
-          <p:nvPr>
-            <p:ph type="title"/>
-          </p:nvPr>
-        </p:nvSpPr>
-        <p:spPr>
-          <a:xfrm>
-            <a:off x="387439" y="296068"/>
-            <a:ext cx="10515600" cy="1325563"/>
-          </a:xfrm>
-        </p:spPr>
-        <p:txBody>
-          <a:bodyPr/>
-          <a:lstStyle/>
-          <a:p>
-            <a:r>
-              <a:rPr lang="es-MX" dirty="0" smtClean="0"/>
-              <a:t>Los aciertos pagan y los errores cuestan….</a:t>
-            </a:r>
-            <a:br>
-              <a:rPr lang="es-MX" dirty="0" smtClean="0"/>
-            </a:br>
-            <a:endParaRPr lang="es-MX" sz="2500" i="1" dirty="0"/>
-          </a:p>
-        </p:txBody>
-      </p:sp>
-      <p:sp>
-        <p:nvSpPr>
-          <p:cNvPr id="3" name="Marcador de contenido 2"/>
-          <p:cNvSpPr>
-            <a:spLocks noGrp="1"/>
-          </p:cNvSpPr>
-          <p:nvPr>
-            <p:ph idx="1"/>
-          </p:nvPr>
-        </p:nvSpPr>
-        <p:spPr/>
-        <p:txBody>
-          <a:bodyPr/>
-          <a:lstStyle/>
-          <a:p>
-            <a:endParaRPr lang="es-MX" dirty="0" smtClean="0"/>
-          </a:p>
-          <a:p>
-            <a:endParaRPr lang="es-MX" dirty="0"/>
-          </a:p>
-        </p:txBody>
-      </p:sp>
-      <p:pic>
-        <p:nvPicPr>
-          <p:cNvPr id="1026" name="Picture 2" descr="Resultado de imagen para conejo blanco y negro dibujo"/>
-          <p:cNvPicPr>
-            <a:picLocks noChangeAspect="1" noChangeArrowheads="1"/>
-          </p:cNvPicPr>
-          <p:nvPr/>
-        </p:nvPicPr>
-        <p:blipFill>
-          <a:blip r:embed="rId2">
-            <a:extLst>
-              <a:ext uri="{28A0092B-C50C-407E-A947-70E740481C1C}">
-                <a14:useLocalDpi xmlns:a14="http://schemas.microsoft.com/office/drawing/2010/main" val="0"/>
-              </a:ext>
-            </a:extLst>
-          </a:blip>
-          <a:srcRect/>
-          <a:stretch>
-            <a:fillRect/>
-          </a:stretch>
-        </p:blipFill>
-        <p:spPr bwMode="auto">
-          <a:xfrm>
-            <a:off x="838200" y="2743200"/>
-            <a:ext cx="2820651" cy="2118864"/>
-          </a:xfrm>
-          <a:prstGeom prst="rect">
-            <a:avLst/>
-          </a:prstGeom>
-          <a:noFill/>
-          <a:extLst>
-            <a:ext uri="{909E8E84-426E-40DD-AFC4-6F175D3DCCD1}">
-              <a14:hiddenFill xmlns:a14="http://schemas.microsoft.com/office/drawing/2010/main">
-                <a:solidFill>
-                  <a:srgbClr val="FFFFFF"/>
-                </a:solidFill>
-              </a14:hiddenFill>
-            </a:ext>
-          </a:extLst>
-        </p:spPr>
-      </p:pic>
-      <p:pic>
-        <p:nvPicPr>
-          <p:cNvPr id="5" name="Imagen 4"/>
-          <p:cNvPicPr>
-            <a:picLocks noChangeAspect="1"/>
-          </p:cNvPicPr>
-          <p:nvPr/>
-        </p:nvPicPr>
-        <p:blipFill>
-          <a:blip r:embed="rId3"/>
-          <a:stretch>
-            <a:fillRect/>
-          </a:stretch>
-        </p:blipFill>
-        <p:spPr>
-          <a:xfrm>
-            <a:off x="4883172" y="1054669"/>
-            <a:ext cx="6315075" cy="5495925"/>
-          </a:xfrm>
-          <a:prstGeom prst="rect">
-            <a:avLst/>
-          </a:prstGeom>
-        </p:spPr>
-      </p:pic>
-    </p:spTree>
-    <p:extLst>
-      <p:ext uri="{BB962C8B-B14F-4D97-AF65-F5344CB8AC3E}">
-        <p14:creationId xmlns:p14="http://schemas.microsoft.com/office/powerpoint/2010/main" val="3151862661"/>
-      </p:ext>
-    </p:extLst>
-  </p:cSld>
-  <p:clrMapOvr>
-    <a:masterClrMapping/>
-  </p:clrMapOvr>
-  <p:timing>
-    <p:tnLst>
-      <p:par>
-        <p:cTn id="1" dur="indefinite" restart="never" nodeType="tmRoot"/>
-      </p:par>
-    </p:tnLst>
-  </p:timing>
-</p:sld>
-</file>
-
-<file path=ppt/slides/slide9.xml><?xml version="1.0" encoding="utf-8"?>
-<p:sld xmlns:a="http://schemas.openxmlformats.org/drawingml/2006/main" xmlns:r="http://schemas.openxmlformats.org/officeDocument/2006/relationships" xmlns:p="http://schemas.openxmlformats.org/presentationml/2006/main">
-  <p:cSld>
-    <p:spTree>
-      <p:nvGrpSpPr>
-        <p:cNvPr id="1" name=""/>
-        <p:cNvGrpSpPr/>
-        <p:nvPr/>
-      </p:nvGrpSpPr>
-      <p:grpSpPr>
-        <a:xfrm>
-          <a:off x="0" y="0"/>
-          <a:ext cx="0" cy="0"/>
-          <a:chOff x="0" y="0"/>
-          <a:chExt cx="0" cy="0"/>
-        </a:xfrm>
-      </p:grpSpPr>
-      <p:sp>
-        <p:nvSpPr>
-          <p:cNvPr id="4" name="Título 3"/>
-          <p:cNvSpPr>
-            <a:spLocks noGrp="1"/>
-          </p:cNvSpPr>
-          <p:nvPr>
-            <p:ph type="title"/>
-          </p:nvPr>
-        </p:nvSpPr>
-        <p:spPr>
-          <a:xfrm>
-            <a:off x="593501" y="133305"/>
-            <a:ext cx="10515600" cy="1325563"/>
-          </a:xfrm>
-        </p:spPr>
-        <p:txBody>
-          <a:bodyPr/>
-          <a:lstStyle/>
-          <a:p>
-            <a:pPr algn="ctr"/>
-            <a:r>
-              <a:rPr lang="es-MX" b="1" dirty="0" smtClean="0">
-                <a:effectLst>
-                  <a:outerShdw blurRad="38100" dist="38100" dir="2700000" algn="tl">
-                    <a:srgbClr val="000000">
-                      <a:alpha val="43137"/>
-                    </a:srgbClr>
-                  </a:outerShdw>
-                </a:effectLst>
-              </a:rPr>
-              <a:t>Teoría de Detección de Señales</a:t>
-            </a:r>
-            <a:endParaRPr lang="es-MX" b="1" dirty="0">
-              <a:effectLst>
-                <a:outerShdw blurRad="38100" dist="38100" dir="2700000" algn="tl">
-                  <a:srgbClr val="000000">
-                    <a:alpha val="43137"/>
-                  </a:srgbClr>
-                </a:outerShdw>
-              </a:effectLst>
-            </a:endParaRPr>
-          </a:p>
-        </p:txBody>
-      </p:sp>
-      <p:sp>
-        <p:nvSpPr>
-          <p:cNvPr id="7" name="Marcador de contenido 6"/>
-          <p:cNvSpPr>
-            <a:spLocks noGrp="1"/>
-          </p:cNvSpPr>
-          <p:nvPr>
-            <p:ph sz="half" idx="1"/>
-          </p:nvPr>
-        </p:nvSpPr>
-        <p:spPr/>
-        <p:txBody>
-          <a:bodyPr/>
-          <a:lstStyle/>
-          <a:p>
-            <a:endParaRPr lang="es-MX" dirty="0" smtClean="0"/>
-          </a:p>
-          <a:p>
-            <a:endParaRPr lang="es-MX" dirty="0"/>
-          </a:p>
-        </p:txBody>
-      </p:sp>
-      <p:sp>
-        <p:nvSpPr>
-          <p:cNvPr id="8" name="Marcador de contenido 7"/>
-          <p:cNvSpPr>
-            <a:spLocks noGrp="1"/>
-          </p:cNvSpPr>
-          <p:nvPr>
-            <p:ph sz="half" idx="2"/>
-          </p:nvPr>
-        </p:nvSpPr>
-        <p:spPr/>
-        <p:txBody>
-          <a:bodyPr/>
-          <a:lstStyle/>
-          <a:p>
-            <a:endParaRPr lang="es-MX" dirty="0" smtClean="0"/>
-          </a:p>
-          <a:p>
-            <a:endParaRPr lang="es-MX" dirty="0"/>
-          </a:p>
-        </p:txBody>
-      </p:sp>
-      <p:pic>
-        <p:nvPicPr>
-          <p:cNvPr id="9" name="Imagen 8"/>
-          <p:cNvPicPr>
-            <a:picLocks noChangeAspect="1"/>
-          </p:cNvPicPr>
-          <p:nvPr/>
-        </p:nvPicPr>
-        <p:blipFill>
-          <a:blip r:embed="rId2"/>
-          <a:stretch>
-            <a:fillRect/>
-          </a:stretch>
-        </p:blipFill>
-        <p:spPr>
-          <a:xfrm>
-            <a:off x="2693764" y="1362075"/>
-            <a:ext cx="6315075" cy="5495925"/>
-          </a:xfrm>
-          <a:prstGeom prst="rect">
-            <a:avLst/>
-          </a:prstGeom>
-        </p:spPr>
-      </p:pic>
-    </p:spTree>
-    <p:extLst>
-      <p:ext uri="{BB962C8B-B14F-4D97-AF65-F5344CB8AC3E}">
-        <p14:creationId xmlns:p14="http://schemas.microsoft.com/office/powerpoint/2010/main" val="3063486277"/>
       </p:ext>
     </p:extLst>
   </p:cSld>
@@ -4706,7 +6611,7 @@
     </a:clrScheme>
     <a:fontScheme name="Office">
       <a:majorFont>
-        <a:latin typeface="Calibri Light" panose="020F0302020204030204"/>
+        <a:latin typeface="Calibri Light"/>
         <a:ea typeface=""/>
         <a:cs typeface=""/>
         <a:font script="Jpan" typeface="ＭＳ Ｐゴシック"/>
@@ -4741,7 +6646,7 @@
         <a:font script="Geor" typeface="Sylfaen"/>
       </a:majorFont>
       <a:minorFont>
-        <a:latin typeface="Calibri" panose="020F0502020204030204"/>
+        <a:latin typeface="Calibri"/>
         <a:ea typeface=""/>
         <a:cs typeface=""/>
         <a:font script="Jpan" typeface="ＭＳ Ｐゴシック"/>
@@ -4918,7 +6823,7 @@
   <a:extraClrSchemeLst/>
   <a:extLst>
     <a:ext uri="{05A4C25C-085E-4340-85A3-A5531E510DB2}">
-      <thm15:themeFamily xmlns:thm15="http://schemas.microsoft.com/office/thememl/2012/main" name="Office Theme" id="{62F939B6-93AF-4DB8-9C6B-D6C7DFDC589F}" vid="{4A3C46E8-61CC-4603-A589-7422A47A8E4A}"/>
+      <thm15:themeFamily xmlns:thm15="http://schemas.microsoft.com/office/thememl/2012/main" xmlns="" name="Office Theme" id="{62F939B6-93AF-4DB8-9C6B-D6C7DFDC589F}" vid="{4A3C46E8-61CC-4603-A589-7422A47A8E4A}"/>
     </a:ext>
   </a:extLst>
 </a:theme>

</xml_diff>